<commit_message>
Preparations for CAA talk, fix Import-Function
</commit_message>
<xml_diff>
--- a/Rose_Girotto_ChronochRt.pptx
+++ b/Rose_Girotto_ChronochRt.pptx
@@ -5,7 +5,7 @@
     <p:sldMasterId id="2147483648" r:id="rId1"/>
   </p:sldMasterIdLst>
   <p:notesMasterIdLst>
-    <p:notesMasterId r:id="rId16"/>
+    <p:notesMasterId r:id="rId18"/>
   </p:notesMasterIdLst>
   <p:sldIdLst>
     <p:sldId id="256" r:id="rId2"/>
@@ -15,13 +15,15 @@
     <p:sldId id="263" r:id="rId6"/>
     <p:sldId id="265" r:id="rId7"/>
     <p:sldId id="264" r:id="rId8"/>
-    <p:sldId id="266" r:id="rId9"/>
-    <p:sldId id="267" r:id="rId10"/>
-    <p:sldId id="268" r:id="rId11"/>
-    <p:sldId id="270" r:id="rId12"/>
-    <p:sldId id="271" r:id="rId13"/>
-    <p:sldId id="269" r:id="rId14"/>
-    <p:sldId id="273" r:id="rId15"/>
+    <p:sldId id="275" r:id="rId9"/>
+    <p:sldId id="277" r:id="rId10"/>
+    <p:sldId id="267" r:id="rId11"/>
+    <p:sldId id="276" r:id="rId12"/>
+    <p:sldId id="268" r:id="rId13"/>
+    <p:sldId id="270" r:id="rId14"/>
+    <p:sldId id="271" r:id="rId15"/>
+    <p:sldId id="269" r:id="rId16"/>
+    <p:sldId id="273" r:id="rId17"/>
   </p:sldIdLst>
   <p:sldSz cx="9144000" cy="5143500" type="screen16x9"/>
   <p:notesSz cx="6858000" cy="9144000"/>
@@ -205,7 +207,8 @@
           <a:p>
             <a:fld id="{47CA4CCA-9673-4F6D-A7D8-7D784B11B010}" type="datetimeFigureOut">
               <a:rPr lang="de-DE" smtClean="0"/>
-              <a:t>22.09.2019</a:t>
+              <a:pPr/>
+              <a:t>23.09.2019</a:t>
             </a:fld>
             <a:endParaRPr lang="de-DE"/>
           </a:p>
@@ -366,6 +369,7 @@
           <a:p>
             <a:fld id="{6B3DA805-DBF4-4312-A750-85E24E9BE691}" type="slidenum">
               <a:rPr lang="de-DE" smtClean="0"/>
+              <a:pPr/>
               <a:t>‹Nr.›</a:t>
             </a:fld>
             <a:endParaRPr lang="de-DE"/>
@@ -652,7 +656,7 @@
             <a:fld id="{50C76A27-9D95-45D5-9F50-DBA97D6708BF}" type="datetimeFigureOut">
               <a:rPr lang="de-DE" smtClean="0"/>
               <a:pPr/>
-              <a:t>22.09.2019</a:t>
+              <a:t>23.09.2019</a:t>
             </a:fld>
             <a:endParaRPr lang="de-DE"/>
           </a:p>
@@ -819,7 +823,7 @@
             <a:fld id="{50C76A27-9D95-45D5-9F50-DBA97D6708BF}" type="datetimeFigureOut">
               <a:rPr lang="de-DE" smtClean="0"/>
               <a:pPr/>
-              <a:t>22.09.2019</a:t>
+              <a:t>23.09.2019</a:t>
             </a:fld>
             <a:endParaRPr lang="de-DE"/>
           </a:p>
@@ -996,7 +1000,7 @@
             <a:fld id="{50C76A27-9D95-45D5-9F50-DBA97D6708BF}" type="datetimeFigureOut">
               <a:rPr lang="de-DE" smtClean="0"/>
               <a:pPr/>
-              <a:t>22.09.2019</a:t>
+              <a:t>23.09.2019</a:t>
             </a:fld>
             <a:endParaRPr lang="de-DE"/>
           </a:p>
@@ -1163,7 +1167,7 @@
             <a:fld id="{50C76A27-9D95-45D5-9F50-DBA97D6708BF}" type="datetimeFigureOut">
               <a:rPr lang="de-DE" smtClean="0"/>
               <a:pPr/>
-              <a:t>22.09.2019</a:t>
+              <a:t>23.09.2019</a:t>
             </a:fld>
             <a:endParaRPr lang="de-DE"/>
           </a:p>
@@ -1406,7 +1410,7 @@
             <a:fld id="{50C76A27-9D95-45D5-9F50-DBA97D6708BF}" type="datetimeFigureOut">
               <a:rPr lang="de-DE" smtClean="0"/>
               <a:pPr/>
-              <a:t>22.09.2019</a:t>
+              <a:t>23.09.2019</a:t>
             </a:fld>
             <a:endParaRPr lang="de-DE"/>
           </a:p>
@@ -1691,7 +1695,7 @@
             <a:fld id="{50C76A27-9D95-45D5-9F50-DBA97D6708BF}" type="datetimeFigureOut">
               <a:rPr lang="de-DE" smtClean="0"/>
               <a:pPr/>
-              <a:t>22.09.2019</a:t>
+              <a:t>23.09.2019</a:t>
             </a:fld>
             <a:endParaRPr lang="de-DE"/>
           </a:p>
@@ -2110,7 +2114,7 @@
             <a:fld id="{50C76A27-9D95-45D5-9F50-DBA97D6708BF}" type="datetimeFigureOut">
               <a:rPr lang="de-DE" smtClean="0"/>
               <a:pPr/>
-              <a:t>22.09.2019</a:t>
+              <a:t>23.09.2019</a:t>
             </a:fld>
             <a:endParaRPr lang="de-DE"/>
           </a:p>
@@ -2225,7 +2229,7 @@
             <a:fld id="{50C76A27-9D95-45D5-9F50-DBA97D6708BF}" type="datetimeFigureOut">
               <a:rPr lang="de-DE" smtClean="0"/>
               <a:pPr/>
-              <a:t>22.09.2019</a:t>
+              <a:t>23.09.2019</a:t>
             </a:fld>
             <a:endParaRPr lang="de-DE"/>
           </a:p>
@@ -2317,7 +2321,7 @@
             <a:fld id="{50C76A27-9D95-45D5-9F50-DBA97D6708BF}" type="datetimeFigureOut">
               <a:rPr lang="de-DE" smtClean="0"/>
               <a:pPr/>
-              <a:t>22.09.2019</a:t>
+              <a:t>23.09.2019</a:t>
             </a:fld>
             <a:endParaRPr lang="de-DE"/>
           </a:p>
@@ -2591,7 +2595,7 @@
             <a:fld id="{50C76A27-9D95-45D5-9F50-DBA97D6708BF}" type="datetimeFigureOut">
               <a:rPr lang="de-DE" smtClean="0"/>
               <a:pPr/>
-              <a:t>22.09.2019</a:t>
+              <a:t>23.09.2019</a:t>
             </a:fld>
             <a:endParaRPr lang="de-DE"/>
           </a:p>
@@ -2841,7 +2845,7 @@
             <a:fld id="{50C76A27-9D95-45D5-9F50-DBA97D6708BF}" type="datetimeFigureOut">
               <a:rPr lang="de-DE" smtClean="0"/>
               <a:pPr/>
-              <a:t>22.09.2019</a:t>
+              <a:t>23.09.2019</a:t>
             </a:fld>
             <a:endParaRPr lang="de-DE"/>
           </a:p>
@@ -3051,7 +3055,7 @@
             <a:fld id="{50C76A27-9D95-45D5-9F50-DBA97D6708BF}" type="datetimeFigureOut">
               <a:rPr lang="de-DE" smtClean="0"/>
               <a:pPr/>
-              <a:t>22.09.2019</a:t>
+              <a:t>23.09.2019</a:t>
             </a:fld>
             <a:endParaRPr lang="de-DE"/>
           </a:p>
@@ -3432,7 +3436,12 @@
             <p:ph type="ctrTitle"/>
           </p:nvPr>
         </p:nvSpPr>
-        <p:spPr/>
+        <p:spPr>
+          <a:xfrm>
+            <a:off x="685800" y="915566"/>
+            <a:ext cx="7772400" cy="1102519"/>
+          </a:xfrm>
+        </p:spPr>
         <p:txBody>
           <a:bodyPr>
             <a:normAutofit fontScale="90000"/>
@@ -3451,14 +3460,7 @@
                 <a:latin typeface="Arial" pitchFamily="34" charset="0"/>
                 <a:cs typeface="Arial" pitchFamily="34" charset="0"/>
               </a:rPr>
-              <a:t> </a:t>
-            </a:r>
-            <a:r>
-              <a:rPr lang="de-DE" i="1" dirty="0" smtClean="0">
-                <a:latin typeface="Arial" pitchFamily="34" charset="0"/>
-                <a:cs typeface="Arial" pitchFamily="34" charset="0"/>
-              </a:rPr>
-              <a:t> </a:t>
+              <a:t>  </a:t>
             </a:r>
             <a:br>
               <a:rPr lang="de-DE" i="1" dirty="0" smtClean="0">
@@ -3471,14 +3473,7 @@
                 <a:latin typeface="Arial" pitchFamily="34" charset="0"/>
                 <a:cs typeface="Arial" pitchFamily="34" charset="0"/>
               </a:rPr>
-              <a:t>Ein </a:t>
-            </a:r>
-            <a:r>
-              <a:rPr lang="de-DE" sz="3600" i="1" dirty="0" smtClean="0">
-                <a:latin typeface="Arial" pitchFamily="34" charset="0"/>
-                <a:cs typeface="Arial" pitchFamily="34" charset="0"/>
-              </a:rPr>
-              <a:t>R-</a:t>
+              <a:t>Ein R-</a:t>
             </a:r>
             <a:r>
               <a:rPr lang="de-DE" sz="3600" i="1" dirty="0" err="1" smtClean="0">
@@ -3520,7 +3515,7 @@
         </p:nvSpPr>
         <p:spPr>
           <a:xfrm>
-            <a:off x="500034" y="3286130"/>
+            <a:off x="602252" y="2603877"/>
             <a:ext cx="7858180" cy="1357322"/>
           </a:xfrm>
         </p:spPr>
@@ -3587,13 +3582,7 @@
               <a:rPr lang="en-US" sz="1800" dirty="0" smtClean="0">
                 <a:latin typeface="Arial Narrow" pitchFamily="34" charset="0"/>
               </a:rPr>
-              <a:t>, </a:t>
-            </a:r>
-            <a:r>
-              <a:rPr lang="en-US" sz="1800" dirty="0" smtClean="0">
-                <a:latin typeface="Arial Narrow" pitchFamily="34" charset="0"/>
-              </a:rPr>
-              <a:t>Israel</a:t>
+              <a:t>, Israel</a:t>
             </a:r>
           </a:p>
           <a:p>
@@ -3636,13 +3625,7 @@
               <a:rPr lang="de-DE" sz="1800" dirty="0" smtClean="0">
                 <a:latin typeface="Arial Narrow" pitchFamily="34" charset="0"/>
               </a:rPr>
-              <a:t> Archäologische Untersuchungen, </a:t>
-            </a:r>
-            <a:r>
-              <a:rPr lang="de-DE" sz="1800" dirty="0" smtClean="0">
-                <a:latin typeface="Arial Narrow" pitchFamily="34" charset="0"/>
-              </a:rPr>
-              <a:t>Münzenberg</a:t>
+              <a:t> Archäologische Untersuchungen, Münzenberg</a:t>
             </a:r>
             <a:endParaRPr lang="de-DE" sz="1800" dirty="0">
               <a:latin typeface="Arial Narrow" pitchFamily="34" charset="0"/>
@@ -3650,6 +3633,58 @@
           </a:p>
         </p:txBody>
       </p:sp>
+      <p:pic>
+        <p:nvPicPr>
+          <p:cNvPr id="4" name="Picture 2" descr="C:\Dokumente\Forschung\Projekte\Promotion\Logos_Vorlagen\ed-archmat.png"/>
+          <p:cNvPicPr>
+            <a:picLocks noChangeAspect="1" noChangeArrowheads="1"/>
+          </p:cNvPicPr>
+          <p:nvPr/>
+        </p:nvPicPr>
+        <p:blipFill>
+          <a:blip r:embed="rId2" cstate="print"/>
+          <a:srcRect/>
+          <a:stretch>
+            <a:fillRect/>
+          </a:stretch>
+        </p:blipFill>
+        <p:spPr bwMode="auto">
+          <a:xfrm>
+            <a:off x="7397982" y="4488558"/>
+            <a:ext cx="1638514" cy="376593"/>
+          </a:xfrm>
+          <a:prstGeom prst="rect">
+            <a:avLst/>
+          </a:prstGeom>
+          <a:noFill/>
+        </p:spPr>
+      </p:pic>
+      <p:pic>
+        <p:nvPicPr>
+          <p:cNvPr id="5" name="Picture 3" descr="C:\Users\Thomas\Desktop\BGU.sig2.E.jpg"/>
+          <p:cNvPicPr>
+            <a:picLocks noChangeAspect="1" noChangeArrowheads="1"/>
+          </p:cNvPicPr>
+          <p:nvPr/>
+        </p:nvPicPr>
+        <p:blipFill>
+          <a:blip r:embed="rId3" cstate="print"/>
+          <a:srcRect/>
+          <a:stretch>
+            <a:fillRect/>
+          </a:stretch>
+        </p:blipFill>
+        <p:spPr bwMode="auto">
+          <a:xfrm>
+            <a:off x="107504" y="4299942"/>
+            <a:ext cx="1368152" cy="753824"/>
+          </a:xfrm>
+          <a:prstGeom prst="rect">
+            <a:avLst/>
+          </a:prstGeom>
+          <a:noFill/>
+        </p:spPr>
+      </p:pic>
     </p:spTree>
   </p:cSld>
   <p:clrMapOvr>
@@ -3694,7 +3729,7 @@
               <a:rPr lang="de-DE" dirty="0" smtClean="0">
                 <a:latin typeface="Arial Narrow" pitchFamily="34" charset="0"/>
               </a:rPr>
-              <a:t>Visualisierung Belegungsphasen</a:t>
+              <a:t>Visualisierung von Perioden</a:t>
             </a:r>
             <a:endParaRPr lang="de-DE" dirty="0">
               <a:latin typeface="Arial Narrow" pitchFamily="34" charset="0"/>
@@ -3704,14 +3739,33 @@
       </p:sp>
       <p:sp>
         <p:nvSpPr>
+          <p:cNvPr id="7" name="Inhaltsplatzhalter 6"/>
+          <p:cNvSpPr>
+            <a:spLocks noGrp="1"/>
+          </p:cNvSpPr>
+          <p:nvPr>
+            <p:ph sz="half" idx="2"/>
+          </p:nvPr>
+        </p:nvSpPr>
+        <p:spPr/>
+        <p:txBody>
+          <a:bodyPr/>
+          <a:lstStyle/>
+          <a:p>
+            <a:endParaRPr lang="de-DE" dirty="0"/>
+          </a:p>
+        </p:txBody>
+      </p:sp>
+      <p:sp>
+        <p:nvSpPr>
           <p:cNvPr id="10" name="Textfeld 9"/>
           <p:cNvSpPr txBox="1"/>
           <p:nvPr/>
         </p:nvSpPr>
         <p:spPr>
           <a:xfrm>
-            <a:off x="928662" y="4357700"/>
-            <a:ext cx="4857784" cy="461665"/>
+            <a:off x="214282" y="4500576"/>
+            <a:ext cx="3714776" cy="276999"/>
           </a:xfrm>
           <a:prstGeom prst="rect">
             <a:avLst/>
@@ -3728,30 +3782,7 @@
               <a:rPr lang="de-DE" sz="1200" dirty="0" smtClean="0">
                 <a:latin typeface="Arial Narrow" pitchFamily="34" charset="0"/>
               </a:rPr>
-              <a:t>Excel Input zur nachmittelalterlichen Belegung einiger Londoner Friedhöfe </a:t>
-            </a:r>
-            <a:br>
-              <a:rPr lang="de-DE" sz="1200" dirty="0" smtClean="0">
-                <a:latin typeface="Arial Narrow" pitchFamily="34" charset="0"/>
-              </a:rPr>
-            </a:br>
-            <a:r>
-              <a:rPr lang="de-DE" sz="1200" dirty="0" smtClean="0">
-                <a:latin typeface="Arial Narrow" pitchFamily="34" charset="0"/>
-              </a:rPr>
-              <a:t>(Auszug Wellcome </a:t>
-            </a:r>
-            <a:r>
-              <a:rPr lang="de-DE" sz="1200" dirty="0" err="1" smtClean="0">
-                <a:latin typeface="Arial Narrow" pitchFamily="34" charset="0"/>
-              </a:rPr>
-              <a:t>Osteological</a:t>
-            </a:r>
-            <a:r>
-              <a:rPr lang="de-DE" sz="1200" dirty="0" smtClean="0">
-                <a:latin typeface="Arial Narrow" pitchFamily="34" charset="0"/>
-              </a:rPr>
-              <a:t> Database)</a:t>
+              <a:t>Excel Input zur Chronologie der Urnenfelderkultur</a:t>
             </a:r>
             <a:endParaRPr lang="de-DE" sz="1200" dirty="0">
               <a:latin typeface="Arial Narrow" pitchFamily="34" charset="0"/>
@@ -3759,27 +3790,153 @@
           </a:p>
         </p:txBody>
       </p:sp>
+      <p:sp>
+        <p:nvSpPr>
+          <p:cNvPr id="11" name="Textfeld 10"/>
+          <p:cNvSpPr txBox="1"/>
+          <p:nvPr/>
+        </p:nvSpPr>
+        <p:spPr>
+          <a:xfrm>
+            <a:off x="4643438" y="4500576"/>
+            <a:ext cx="3714776" cy="276999"/>
+          </a:xfrm>
+          <a:prstGeom prst="rect">
+            <a:avLst/>
+          </a:prstGeom>
+          <a:noFill/>
+        </p:spPr>
+        <p:txBody>
+          <a:bodyPr wrap="square" rtlCol="0">
+            <a:spAutoFit/>
+          </a:bodyPr>
+          <a:lstStyle/>
+          <a:p>
+            <a:r>
+              <a:rPr lang="de-DE" sz="1200" dirty="0" err="1" smtClean="0">
+                <a:latin typeface="Arial Narrow" pitchFamily="34" charset="0"/>
+              </a:rPr>
+              <a:t>ChronochRt</a:t>
+            </a:r>
+            <a:r>
+              <a:rPr lang="de-DE" sz="1200" dirty="0" smtClean="0">
+                <a:latin typeface="Arial Narrow" pitchFamily="34" charset="0"/>
+              </a:rPr>
+              <a:t> </a:t>
+            </a:r>
+            <a:r>
+              <a:rPr lang="de-DE" sz="1200" dirty="0" err="1" smtClean="0">
+                <a:latin typeface="Arial Narrow" pitchFamily="34" charset="0"/>
+              </a:rPr>
+              <a:t>output</a:t>
+            </a:r>
+            <a:r>
+              <a:rPr lang="de-DE" sz="1200" dirty="0" smtClean="0">
+                <a:latin typeface="Arial Narrow" pitchFamily="34" charset="0"/>
+              </a:rPr>
+              <a:t> zur Chronologie der Urnenfelderkultur</a:t>
+            </a:r>
+            <a:endParaRPr lang="de-DE" sz="1200" dirty="0">
+              <a:latin typeface="Arial Narrow" pitchFamily="34" charset="0"/>
+            </a:endParaRPr>
+          </a:p>
+        </p:txBody>
+      </p:sp>
+      <p:sp>
+        <p:nvSpPr>
+          <p:cNvPr id="12" name="Fußzeilenplatzhalter 12"/>
+          <p:cNvSpPr>
+            <a:spLocks noGrp="1"/>
+          </p:cNvSpPr>
+          <p:nvPr>
+            <p:ph type="ftr" sz="quarter" idx="11"/>
+          </p:nvPr>
+        </p:nvSpPr>
+        <p:spPr>
+          <a:xfrm>
+            <a:off x="214282" y="4767263"/>
+            <a:ext cx="5805518" cy="273844"/>
+          </a:xfrm>
+        </p:spPr>
+        <p:txBody>
+          <a:bodyPr/>
+          <a:lstStyle/>
+          <a:p>
+            <a:pPr algn="l"/>
+            <a:r>
+              <a:rPr lang="en-US" sz="1100" dirty="0" smtClean="0">
+                <a:latin typeface="Arial Narrow" pitchFamily="34" charset="0"/>
+              </a:rPr>
+              <a:t>Rose, </a:t>
+            </a:r>
+            <a:r>
+              <a:rPr lang="en-US" sz="1100" dirty="0" err="1" smtClean="0">
+                <a:latin typeface="Arial Narrow" pitchFamily="34" charset="0"/>
+              </a:rPr>
+              <a:t>Girotto</a:t>
+            </a:r>
+            <a:r>
+              <a:rPr lang="en-US" sz="1100" dirty="0" smtClean="0">
+                <a:latin typeface="Arial Narrow" pitchFamily="34" charset="0"/>
+              </a:rPr>
+              <a:t>, </a:t>
+            </a:r>
+            <a:r>
+              <a:rPr lang="en-US" sz="1100" dirty="0" err="1" smtClean="0">
+                <a:latin typeface="Arial Narrow" pitchFamily="34" charset="0"/>
+              </a:rPr>
+              <a:t>ChronochRt</a:t>
+            </a:r>
+            <a:r>
+              <a:rPr lang="en-US" sz="1100" dirty="0" smtClean="0">
+                <a:latin typeface="Arial Narrow" pitchFamily="34" charset="0"/>
+              </a:rPr>
+              <a:t> @CAA-D 2019 Wilhelmshaven</a:t>
+            </a:r>
+            <a:endParaRPr lang="de-DE" sz="1100" dirty="0">
+              <a:latin typeface="Arial Narrow" pitchFamily="34" charset="0"/>
+            </a:endParaRPr>
+          </a:p>
+        </p:txBody>
+      </p:sp>
+      <p:sp>
+        <p:nvSpPr>
+          <p:cNvPr id="13" name="Inhaltsplatzhalter 12"/>
+          <p:cNvSpPr>
+            <a:spLocks noGrp="1"/>
+          </p:cNvSpPr>
+          <p:nvPr>
+            <p:ph sz="half" idx="1"/>
+          </p:nvPr>
+        </p:nvSpPr>
+        <p:spPr/>
+        <p:txBody>
+          <a:bodyPr/>
+          <a:lstStyle/>
+          <a:p>
+            <a:endParaRPr lang="de-DE" dirty="0"/>
+          </a:p>
+        </p:txBody>
+      </p:sp>
       <p:pic>
         <p:nvPicPr>
-          <p:cNvPr id="18436" name="Picture 4"/>
+          <p:cNvPr id="4099" name="Picture 3"/>
           <p:cNvPicPr>
-            <a:picLocks noGrp="1" noChangeAspect="1" noChangeArrowheads="1"/>
+            <a:picLocks noChangeAspect="1" noChangeArrowheads="1"/>
           </p:cNvPicPr>
-          <p:nvPr>
-            <p:ph sz="half" idx="1"/>
-          </p:nvPr>
+          <p:nvPr/>
         </p:nvPicPr>
         <p:blipFill>
-          <a:blip r:embed="rId2"/>
-          <a:srcRect t="24596" r="59609" b="28020"/>
+          <a:blip r:embed="rId2" cstate="print"/>
+          <a:srcRect l="5526" t="19066" r="39765" b="51092"/>
           <a:stretch>
             <a:fillRect/>
           </a:stretch>
         </p:blipFill>
         <p:spPr bwMode="auto">
           <a:xfrm>
-            <a:off x="928662" y="1071552"/>
-            <a:ext cx="4929222" cy="3251189"/>
+            <a:off x="539552" y="1131590"/>
+            <a:ext cx="8118902" cy="2952328"/>
           </a:xfrm>
           <a:prstGeom prst="rect">
             <a:avLst/>
@@ -3791,142 +3948,8 @@
             <a:headEnd/>
             <a:tailEnd/>
           </a:ln>
-          <a:effectLst/>
         </p:spPr>
       </p:pic>
-      <p:sp>
-        <p:nvSpPr>
-          <p:cNvPr id="12" name="Textfeld 11"/>
-          <p:cNvSpPr txBox="1"/>
-          <p:nvPr/>
-        </p:nvSpPr>
-        <p:spPr>
-          <a:xfrm>
-            <a:off x="6072198" y="1643056"/>
-            <a:ext cx="2714644" cy="1600438"/>
-          </a:xfrm>
-          <a:prstGeom prst="rect">
-            <a:avLst/>
-          </a:prstGeom>
-          <a:noFill/>
-        </p:spPr>
-        <p:txBody>
-          <a:bodyPr wrap="square" rtlCol="0">
-            <a:spAutoFit/>
-          </a:bodyPr>
-          <a:lstStyle/>
-          <a:p>
-            <a:r>
-              <a:rPr lang="de-DE" sz="1600" dirty="0" smtClean="0">
-                <a:latin typeface="Arial Narrow" pitchFamily="34" charset="0"/>
-              </a:rPr>
-              <a:t>Labels:</a:t>
-            </a:r>
-          </a:p>
-          <a:p>
-            <a:r>
-              <a:rPr lang="en-US" sz="1600" dirty="0" smtClean="0">
-                <a:latin typeface="Arial Narrow" pitchFamily="34" charset="0"/>
-              </a:rPr>
-              <a:t>1559 - Coronation of Elizabeth I</a:t>
-            </a:r>
-          </a:p>
-          <a:p>
-            <a:r>
-              <a:rPr lang="en-US" sz="1600" dirty="0" smtClean="0">
-                <a:latin typeface="Arial Narrow" pitchFamily="34" charset="0"/>
-              </a:rPr>
-              <a:t> </a:t>
-            </a:r>
-            <a:r>
-              <a:rPr lang="en-US" sz="1600" dirty="0" smtClean="0">
-                <a:latin typeface="Arial Narrow" pitchFamily="34" charset="0"/>
-              </a:rPr>
-              <a:t>12.04.1665 </a:t>
-            </a:r>
-            <a:r>
-              <a:rPr lang="en-US" sz="1600" dirty="0" smtClean="0">
-                <a:latin typeface="Arial Narrow" pitchFamily="34" charset="0"/>
-              </a:rPr>
-              <a:t>- The "Great Plague of London" begins [in plague deaths]</a:t>
-            </a:r>
-          </a:p>
-          <a:p>
-            <a:r>
-              <a:rPr lang="en-US" sz="1600" dirty="0" smtClean="0">
-                <a:latin typeface="Arial Narrow" pitchFamily="34" charset="0"/>
-              </a:rPr>
-              <a:t> </a:t>
-            </a:r>
-            <a:r>
-              <a:rPr lang="en-US" sz="1600" dirty="0" smtClean="0">
-                <a:latin typeface="Arial Narrow" pitchFamily="34" charset="0"/>
-              </a:rPr>
-              <a:t>1666 - Great Fire of London</a:t>
-            </a:r>
-            <a:endParaRPr lang="de-DE" sz="1600" dirty="0">
-              <a:latin typeface="Arial Narrow" pitchFamily="34" charset="0"/>
-            </a:endParaRPr>
-          </a:p>
-        </p:txBody>
-      </p:sp>
-      <p:sp>
-        <p:nvSpPr>
-          <p:cNvPr id="13" name="Fußzeilenplatzhalter 12"/>
-          <p:cNvSpPr>
-            <a:spLocks noGrp="1"/>
-          </p:cNvSpPr>
-          <p:nvPr>
-            <p:ph type="ftr" sz="quarter" idx="11"/>
-          </p:nvPr>
-        </p:nvSpPr>
-        <p:spPr>
-          <a:xfrm>
-            <a:off x="214282" y="4767263"/>
-            <a:ext cx="5805518" cy="273844"/>
-          </a:xfrm>
-        </p:spPr>
-        <p:txBody>
-          <a:bodyPr/>
-          <a:lstStyle/>
-          <a:p>
-            <a:pPr algn="l"/>
-            <a:r>
-              <a:rPr lang="en-US" sz="1100" dirty="0" smtClean="0">
-                <a:latin typeface="Arial Narrow" pitchFamily="34" charset="0"/>
-              </a:rPr>
-              <a:t>Rose, </a:t>
-            </a:r>
-            <a:r>
-              <a:rPr lang="en-US" sz="1100" dirty="0" err="1" smtClean="0">
-                <a:latin typeface="Arial Narrow" pitchFamily="34" charset="0"/>
-              </a:rPr>
-              <a:t>Girotto</a:t>
-            </a:r>
-            <a:r>
-              <a:rPr lang="en-US" sz="1100" dirty="0" smtClean="0">
-                <a:latin typeface="Arial Narrow" pitchFamily="34" charset="0"/>
-              </a:rPr>
-              <a:t>, </a:t>
-            </a:r>
-            <a:r>
-              <a:rPr lang="en-US" sz="1100" dirty="0" err="1" smtClean="0">
-                <a:latin typeface="Arial Narrow" pitchFamily="34" charset="0"/>
-              </a:rPr>
-              <a:t>ChronochRt</a:t>
-            </a:r>
-            <a:r>
-              <a:rPr lang="en-US" sz="1100" dirty="0" smtClean="0">
-                <a:latin typeface="Arial Narrow" pitchFamily="34" charset="0"/>
-              </a:rPr>
-              <a:t> @CAA-D 2019 Wilhelmshaven</a:t>
-            </a:r>
-            <a:endParaRPr lang="de-DE" sz="1100" dirty="0">
-              <a:latin typeface="Arial Narrow" pitchFamily="34" charset="0"/>
-            </a:endParaRPr>
-          </a:p>
-        </p:txBody>
-      </p:sp>
     </p:spTree>
   </p:cSld>
   <p:clrMapOvr>
@@ -3971,7 +3994,7 @@
               <a:rPr lang="de-DE" dirty="0" smtClean="0">
                 <a:latin typeface="Arial Narrow" pitchFamily="34" charset="0"/>
               </a:rPr>
-              <a:t>Visualisierung Belegungsphasen</a:t>
+              <a:t>Visualisierung von Perioden</a:t>
             </a:r>
             <a:endParaRPr lang="de-DE" dirty="0">
               <a:latin typeface="Arial Narrow" pitchFamily="34" charset="0"/>
@@ -3981,14 +4004,68 @@
       </p:sp>
       <p:sp>
         <p:nvSpPr>
+          <p:cNvPr id="7" name="Inhaltsplatzhalter 6"/>
+          <p:cNvSpPr>
+            <a:spLocks noGrp="1"/>
+          </p:cNvSpPr>
+          <p:nvPr>
+            <p:ph sz="half" idx="2"/>
+          </p:nvPr>
+        </p:nvSpPr>
+        <p:spPr/>
+        <p:txBody>
+          <a:bodyPr/>
+          <a:lstStyle/>
+          <a:p>
+            <a:endParaRPr lang="de-DE" dirty="0"/>
+          </a:p>
+        </p:txBody>
+      </p:sp>
+      <p:pic>
+        <p:nvPicPr>
+          <p:cNvPr id="17411" name="Picture 3"/>
+          <p:cNvPicPr>
+            <a:picLocks noGrp="1" noChangeAspect="1" noChangeArrowheads="1"/>
+          </p:cNvPicPr>
+          <p:nvPr>
+            <p:ph sz="half" idx="1"/>
+          </p:nvPr>
+        </p:nvPicPr>
+        <p:blipFill>
+          <a:blip r:embed="rId2" cstate="print"/>
+          <a:srcRect l="-614" t="24008" r="67100" b="33118"/>
+          <a:stretch>
+            <a:fillRect/>
+          </a:stretch>
+        </p:blipFill>
+        <p:spPr bwMode="auto">
+          <a:xfrm>
+            <a:off x="142844" y="1357304"/>
+            <a:ext cx="4286280" cy="3082849"/>
+          </a:xfrm>
+          <a:prstGeom prst="rect">
+            <a:avLst/>
+          </a:prstGeom>
+          <a:noFill/>
+          <a:ln w="9525">
+            <a:noFill/>
+            <a:miter lim="800000"/>
+            <a:headEnd/>
+            <a:tailEnd/>
+          </a:ln>
+          <a:effectLst/>
+        </p:spPr>
+      </p:pic>
+      <p:sp>
+        <p:nvSpPr>
           <p:cNvPr id="10" name="Textfeld 9"/>
           <p:cNvSpPr txBox="1"/>
           <p:nvPr/>
         </p:nvSpPr>
         <p:spPr>
           <a:xfrm>
-            <a:off x="428596" y="4500576"/>
-            <a:ext cx="8286808" cy="276999"/>
+            <a:off x="214282" y="4500576"/>
+            <a:ext cx="3714776" cy="276999"/>
           </a:xfrm>
           <a:prstGeom prst="rect">
             <a:avLst/>
@@ -4002,28 +4079,10 @@
           <a:lstStyle/>
           <a:p>
             <a:r>
-              <a:rPr lang="de-DE" sz="1200" dirty="0" err="1" smtClean="0">
-                <a:latin typeface="Arial Narrow" pitchFamily="34" charset="0"/>
-              </a:rPr>
-              <a:t>ChronochRt</a:t>
-            </a:r>
-            <a:r>
               <a:rPr lang="de-DE" sz="1200" dirty="0" smtClean="0">
                 <a:latin typeface="Arial Narrow" pitchFamily="34" charset="0"/>
               </a:rPr>
-              <a:t> Output zur nachmittelalterlichen Belegung einiger Londoner Friedhöfe. (Auszug Wellcome </a:t>
-            </a:r>
-            <a:r>
-              <a:rPr lang="de-DE" sz="1200" dirty="0" err="1" smtClean="0">
-                <a:latin typeface="Arial Narrow" pitchFamily="34" charset="0"/>
-              </a:rPr>
-              <a:t>Osteological</a:t>
-            </a:r>
-            <a:r>
-              <a:rPr lang="de-DE" sz="1200" dirty="0" smtClean="0">
-                <a:latin typeface="Arial Narrow" pitchFamily="34" charset="0"/>
-              </a:rPr>
-              <a:t> Database)</a:t>
+              <a:t>Excel Input zur Chronologie der Urnenfelderkultur</a:t>
             </a:r>
             <a:endParaRPr lang="de-DE" sz="1200" dirty="0">
               <a:latin typeface="Arial Narrow" pitchFamily="34" charset="0"/>
@@ -4033,26 +4092,59 @@
       </p:sp>
       <p:sp>
         <p:nvSpPr>
-          <p:cNvPr id="6" name="Inhaltsplatzhalter 5"/>
-          <p:cNvSpPr>
-            <a:spLocks noGrp="1"/>
-          </p:cNvSpPr>
-          <p:nvPr>
-            <p:ph sz="half" idx="1"/>
-          </p:nvPr>
-        </p:nvSpPr>
-        <p:spPr/>
-        <p:txBody>
-          <a:bodyPr/>
-          <a:lstStyle/>
-          <a:p>
-            <a:endParaRPr lang="de-DE" dirty="0"/>
-          </a:p>
-        </p:txBody>
-      </p:sp>
-      <p:sp>
-        <p:nvSpPr>
-          <p:cNvPr id="7" name="Fußzeilenplatzhalter 12"/>
+          <p:cNvPr id="11" name="Textfeld 10"/>
+          <p:cNvSpPr txBox="1"/>
+          <p:nvPr/>
+        </p:nvSpPr>
+        <p:spPr>
+          <a:xfrm>
+            <a:off x="4643438" y="4500576"/>
+            <a:ext cx="3714776" cy="276999"/>
+          </a:xfrm>
+          <a:prstGeom prst="rect">
+            <a:avLst/>
+          </a:prstGeom>
+          <a:noFill/>
+        </p:spPr>
+        <p:txBody>
+          <a:bodyPr wrap="square" rtlCol="0">
+            <a:spAutoFit/>
+          </a:bodyPr>
+          <a:lstStyle/>
+          <a:p>
+            <a:r>
+              <a:rPr lang="de-DE" sz="1200" dirty="0" err="1" smtClean="0">
+                <a:latin typeface="Arial Narrow" pitchFamily="34" charset="0"/>
+              </a:rPr>
+              <a:t>ChronochRt</a:t>
+            </a:r>
+            <a:r>
+              <a:rPr lang="de-DE" sz="1200" dirty="0" smtClean="0">
+                <a:latin typeface="Arial Narrow" pitchFamily="34" charset="0"/>
+              </a:rPr>
+              <a:t> </a:t>
+            </a:r>
+            <a:r>
+              <a:rPr lang="de-DE" sz="1200" dirty="0" err="1" smtClean="0">
+                <a:latin typeface="Arial Narrow" pitchFamily="34" charset="0"/>
+              </a:rPr>
+              <a:t>output</a:t>
+            </a:r>
+            <a:r>
+              <a:rPr lang="de-DE" sz="1200" dirty="0" smtClean="0">
+                <a:latin typeface="Arial Narrow" pitchFamily="34" charset="0"/>
+              </a:rPr>
+              <a:t> zur Chronologie der Urnenfelderkultur</a:t>
+            </a:r>
+            <a:endParaRPr lang="de-DE" sz="1200" dirty="0">
+              <a:latin typeface="Arial Narrow" pitchFamily="34" charset="0"/>
+            </a:endParaRPr>
+          </a:p>
+        </p:txBody>
+      </p:sp>
+      <p:sp>
+        <p:nvSpPr>
+          <p:cNvPr id="12" name="Fußzeilenplatzhalter 12"/>
           <p:cNvSpPr>
             <a:spLocks noGrp="1"/>
           </p:cNvSpPr>
@@ -4107,6 +4199,39 @@
           </a:p>
         </p:txBody>
       </p:sp>
+      <p:pic>
+        <p:nvPicPr>
+          <p:cNvPr id="4098" name="Picture 2"/>
+          <p:cNvPicPr>
+            <a:picLocks noChangeAspect="1" noChangeArrowheads="1"/>
+          </p:cNvPicPr>
+          <p:nvPr/>
+        </p:nvPicPr>
+        <p:blipFill>
+          <a:blip r:embed="rId3" cstate="print"/>
+          <a:srcRect/>
+          <a:stretch>
+            <a:fillRect/>
+          </a:stretch>
+        </p:blipFill>
+        <p:spPr bwMode="auto">
+          <a:xfrm>
+            <a:off x="4538525" y="1419572"/>
+            <a:ext cx="4425963" cy="2952378"/>
+          </a:xfrm>
+          <a:prstGeom prst="rect">
+            <a:avLst/>
+          </a:prstGeom>
+          <a:noFill/>
+          <a:ln w="9525">
+            <a:noFill/>
+            <a:miter lim="800000"/>
+            <a:headEnd/>
+            <a:tailEnd/>
+          </a:ln>
+          <a:effectLst/>
+        </p:spPr>
+      </p:pic>
     </p:spTree>
   </p:cSld>
   <p:clrMapOvr>
@@ -4151,7 +4276,7 @@
               <a:rPr lang="de-DE" dirty="0" smtClean="0">
                 <a:latin typeface="Arial Narrow" pitchFamily="34" charset="0"/>
               </a:rPr>
-              <a:t>Aktueller Stand</a:t>
+              <a:t>Visualisierung Belegungsphasen</a:t>
             </a:r>
             <a:endParaRPr lang="de-DE" dirty="0">
               <a:latin typeface="Arial Narrow" pitchFamily="34" charset="0"/>
@@ -4161,77 +4286,14 @@
       </p:sp>
       <p:sp>
         <p:nvSpPr>
-          <p:cNvPr id="5" name="Textplatzhalter 4"/>
-          <p:cNvSpPr>
-            <a:spLocks noGrp="1"/>
-          </p:cNvSpPr>
-          <p:nvPr>
-            <p:ph type="body" idx="1"/>
-          </p:nvPr>
-        </p:nvSpPr>
-        <p:spPr/>
-        <p:txBody>
-          <a:bodyPr/>
-          <a:lstStyle/>
-          <a:p>
-            <a:r>
-              <a:rPr lang="de-DE" dirty="0" smtClean="0"/>
-              <a:t>Aktuelle Arbeiten</a:t>
-            </a:r>
-            <a:endParaRPr lang="de-DE" dirty="0"/>
-          </a:p>
-        </p:txBody>
-      </p:sp>
-      <p:sp>
-        <p:nvSpPr>
-          <p:cNvPr id="6" name="Inhaltsplatzhalter 5"/>
-          <p:cNvSpPr>
-            <a:spLocks noGrp="1"/>
-          </p:cNvSpPr>
-          <p:nvPr>
-            <p:ph sz="half" idx="2"/>
-          </p:nvPr>
-        </p:nvSpPr>
-        <p:spPr/>
-        <p:txBody>
-          <a:bodyPr/>
-          <a:lstStyle/>
-          <a:p>
-            <a:r>
-              <a:rPr lang="de-DE" dirty="0" smtClean="0"/>
-              <a:t>Importfunktionen</a:t>
-            </a:r>
-          </a:p>
-          <a:p>
-            <a:r>
-              <a:rPr lang="de-DE" dirty="0" smtClean="0"/>
-              <a:t>Erweiterte Unterstützung konkurrierender Systeme in einer Region</a:t>
-            </a:r>
-          </a:p>
-          <a:p>
-            <a:r>
-              <a:rPr lang="de-DE" dirty="0" smtClean="0"/>
-              <a:t>Prüfung der Dateneingabe</a:t>
-            </a:r>
-          </a:p>
-          <a:p>
-            <a:endParaRPr lang="de-DE" dirty="0" smtClean="0"/>
-          </a:p>
-          <a:p>
-            <a:endParaRPr lang="de-DE" dirty="0"/>
-          </a:p>
-        </p:txBody>
-      </p:sp>
-      <p:sp>
-        <p:nvSpPr>
-          <p:cNvPr id="9" name="Textfeld 8"/>
+          <p:cNvPr id="10" name="Textfeld 9"/>
           <p:cNvSpPr txBox="1"/>
           <p:nvPr/>
         </p:nvSpPr>
         <p:spPr>
           <a:xfrm>
-            <a:off x="642910" y="4286262"/>
-            <a:ext cx="7786742" cy="492443"/>
+            <a:off x="928662" y="4357700"/>
+            <a:ext cx="4857784" cy="461665"/>
           </a:xfrm>
           <a:prstGeom prst="rect">
             <a:avLst/>
@@ -4244,60 +4306,173 @@
           </a:bodyPr>
           <a:lstStyle/>
           <a:p>
-            <a:pPr algn="ctr"/>
-            <a:r>
-              <a:rPr lang="de-DE" sz="2600" b="1" dirty="0" smtClean="0"/>
-              <a:t>Umwandlung des Scripts in ein R-</a:t>
-            </a:r>
-            <a:r>
-              <a:rPr lang="de-DE" sz="2600" b="1" dirty="0" err="1" smtClean="0"/>
-              <a:t>Package</a:t>
-            </a:r>
-            <a:endParaRPr lang="de-DE" sz="2600" b="1" dirty="0"/>
-          </a:p>
-        </p:txBody>
-      </p:sp>
-      <p:sp>
-        <p:nvSpPr>
-          <p:cNvPr id="10" name="Inhaltsplatzhalter 9"/>
-          <p:cNvSpPr>
-            <a:spLocks noGrp="1"/>
-          </p:cNvSpPr>
-          <p:nvPr>
-            <p:ph sz="quarter" idx="4"/>
-          </p:nvPr>
-        </p:nvSpPr>
-        <p:spPr/>
-        <p:txBody>
-          <a:bodyPr/>
-          <a:lstStyle/>
-          <a:p>
-            <a:endParaRPr lang="de-DE"/>
-          </a:p>
-        </p:txBody>
-      </p:sp>
-      <p:sp>
-        <p:nvSpPr>
-          <p:cNvPr id="11" name="Textplatzhalter 10"/>
-          <p:cNvSpPr>
-            <a:spLocks noGrp="1"/>
-          </p:cNvSpPr>
-          <p:nvPr>
-            <p:ph type="body" sz="quarter" idx="3"/>
-          </p:nvPr>
-        </p:nvSpPr>
-        <p:spPr/>
-        <p:txBody>
-          <a:bodyPr/>
-          <a:lstStyle/>
-          <a:p>
-            <a:endParaRPr lang="de-DE"/>
-          </a:p>
-        </p:txBody>
-      </p:sp>
-      <p:sp>
-        <p:nvSpPr>
-          <p:cNvPr id="12" name="Fußzeilenplatzhalter 12"/>
+            <a:r>
+              <a:rPr lang="de-DE" sz="1200" dirty="0" smtClean="0">
+                <a:latin typeface="Arial Narrow" pitchFamily="34" charset="0"/>
+              </a:rPr>
+              <a:t>Excel Input zur nachmittelalterlichen Belegung einiger Londoner Friedhöfe </a:t>
+            </a:r>
+            <a:br>
+              <a:rPr lang="de-DE" sz="1200" dirty="0" smtClean="0">
+                <a:latin typeface="Arial Narrow" pitchFamily="34" charset="0"/>
+              </a:rPr>
+            </a:br>
+            <a:r>
+              <a:rPr lang="de-DE" sz="1200" dirty="0" smtClean="0">
+                <a:latin typeface="Arial Narrow" pitchFamily="34" charset="0"/>
+              </a:rPr>
+              <a:t>(Auszug Wellcome </a:t>
+            </a:r>
+            <a:r>
+              <a:rPr lang="de-DE" sz="1200" dirty="0" err="1" smtClean="0">
+                <a:latin typeface="Arial Narrow" pitchFamily="34" charset="0"/>
+              </a:rPr>
+              <a:t>Osteological</a:t>
+            </a:r>
+            <a:r>
+              <a:rPr lang="de-DE" sz="1200" dirty="0" smtClean="0">
+                <a:latin typeface="Arial Narrow" pitchFamily="34" charset="0"/>
+              </a:rPr>
+              <a:t> Database)</a:t>
+            </a:r>
+            <a:endParaRPr lang="de-DE" sz="1200" dirty="0">
+              <a:latin typeface="Arial Narrow" pitchFamily="34" charset="0"/>
+            </a:endParaRPr>
+          </a:p>
+        </p:txBody>
+      </p:sp>
+      <p:pic>
+        <p:nvPicPr>
+          <p:cNvPr id="18436" name="Picture 4"/>
+          <p:cNvPicPr>
+            <a:picLocks noGrp="1" noChangeAspect="1" noChangeArrowheads="1"/>
+          </p:cNvPicPr>
+          <p:nvPr>
+            <p:ph sz="half" idx="1"/>
+          </p:nvPr>
+        </p:nvPicPr>
+        <p:blipFill>
+          <a:blip r:embed="rId2" cstate="print"/>
+          <a:srcRect t="24596" r="59609" b="28020"/>
+          <a:stretch>
+            <a:fillRect/>
+          </a:stretch>
+        </p:blipFill>
+        <p:spPr bwMode="auto">
+          <a:xfrm>
+            <a:off x="928662" y="1071552"/>
+            <a:ext cx="4929222" cy="3251189"/>
+          </a:xfrm>
+          <a:prstGeom prst="rect">
+            <a:avLst/>
+          </a:prstGeom>
+          <a:noFill/>
+          <a:ln w="9525">
+            <a:noFill/>
+            <a:miter lim="800000"/>
+            <a:headEnd/>
+            <a:tailEnd/>
+          </a:ln>
+          <a:effectLst/>
+        </p:spPr>
+      </p:pic>
+      <p:sp>
+        <p:nvSpPr>
+          <p:cNvPr id="12" name="Textfeld 11"/>
+          <p:cNvSpPr txBox="1"/>
+          <p:nvPr/>
+        </p:nvSpPr>
+        <p:spPr>
+          <a:xfrm>
+            <a:off x="6072198" y="1643056"/>
+            <a:ext cx="2714644" cy="1323439"/>
+          </a:xfrm>
+          <a:prstGeom prst="rect">
+            <a:avLst/>
+          </a:prstGeom>
+          <a:noFill/>
+        </p:spPr>
+        <p:txBody>
+          <a:bodyPr wrap="square" rtlCol="0">
+            <a:spAutoFit/>
+          </a:bodyPr>
+          <a:lstStyle/>
+          <a:p>
+            <a:r>
+              <a:rPr lang="de-DE" sz="1600" dirty="0" smtClean="0">
+                <a:latin typeface="Arial Narrow" pitchFamily="34" charset="0"/>
+              </a:rPr>
+              <a:t>Labels:</a:t>
+            </a:r>
+          </a:p>
+          <a:p>
+            <a:pPr marL="90488" indent="-90488"/>
+            <a:r>
+              <a:rPr lang="en-US" sz="1600" dirty="0" smtClean="0">
+                <a:latin typeface="Arial Narrow" pitchFamily="34" charset="0"/>
+              </a:rPr>
+              <a:t>1559 - Coronation of Elizabeth I</a:t>
+            </a:r>
+          </a:p>
+          <a:p>
+            <a:pPr marL="90488" indent="-90488"/>
+            <a:r>
+              <a:rPr lang="en-US" sz="1600" dirty="0" smtClean="0">
+                <a:latin typeface="Arial Narrow" pitchFamily="34" charset="0"/>
+              </a:rPr>
+              <a:t>12.04.1665 </a:t>
+            </a:r>
+            <a:r>
+              <a:rPr lang="en-US" sz="1600" dirty="0" smtClean="0">
+                <a:latin typeface="Arial Narrow" pitchFamily="34" charset="0"/>
+              </a:rPr>
+              <a:t>- The "Great </a:t>
+            </a:r>
+            <a:r>
+              <a:rPr lang="en-US" sz="1600" dirty="0" smtClean="0">
+                <a:latin typeface="Arial Narrow" pitchFamily="34" charset="0"/>
+              </a:rPr>
+              <a:t>Plague of </a:t>
+            </a:r>
+            <a:r>
+              <a:rPr lang="en-US" sz="1600" dirty="0" smtClean="0">
+                <a:latin typeface="Arial Narrow" pitchFamily="34" charset="0"/>
+              </a:rPr>
+              <a:t>London" </a:t>
+            </a:r>
+            <a:r>
+              <a:rPr lang="en-US" sz="1600" dirty="0" smtClean="0">
+                <a:latin typeface="Arial Narrow" pitchFamily="34" charset="0"/>
+              </a:rPr>
+              <a:t>begins</a:t>
+            </a:r>
+            <a:endParaRPr lang="en-US" sz="1600" dirty="0" smtClean="0">
+              <a:latin typeface="Arial Narrow" pitchFamily="34" charset="0"/>
+            </a:endParaRPr>
+          </a:p>
+          <a:p>
+            <a:pPr marL="90488" indent="-90488"/>
+            <a:r>
+              <a:rPr lang="en-US" sz="1600" dirty="0" smtClean="0">
+                <a:latin typeface="Arial Narrow" pitchFamily="34" charset="0"/>
+              </a:rPr>
+              <a:t>1666 </a:t>
+            </a:r>
+            <a:r>
+              <a:rPr lang="en-US" sz="1600" dirty="0" smtClean="0">
+                <a:latin typeface="Arial Narrow" pitchFamily="34" charset="0"/>
+              </a:rPr>
+              <a:t>- Great Fire of London</a:t>
+            </a:r>
+            <a:endParaRPr lang="de-DE" sz="1600" dirty="0">
+              <a:latin typeface="Arial Narrow" pitchFamily="34" charset="0"/>
+            </a:endParaRPr>
+          </a:p>
+        </p:txBody>
+      </p:sp>
+      <p:sp>
+        <p:nvSpPr>
+          <p:cNvPr id="13" name="Fußzeilenplatzhalter 12"/>
           <p:cNvSpPr>
             <a:spLocks noGrp="1"/>
           </p:cNvSpPr>
@@ -4396,7 +4571,7 @@
               <a:rPr lang="de-DE" dirty="0" smtClean="0">
                 <a:latin typeface="Arial Narrow" pitchFamily="34" charset="0"/>
               </a:rPr>
-              <a:t>Aktueller Stand</a:t>
+              <a:t>Visualisierung Belegungsphasen</a:t>
             </a:r>
             <a:endParaRPr lang="de-DE" dirty="0">
               <a:latin typeface="Arial Narrow" pitchFamily="34" charset="0"/>
@@ -4406,148 +4581,14 @@
       </p:sp>
       <p:sp>
         <p:nvSpPr>
-          <p:cNvPr id="5" name="Textplatzhalter 4"/>
-          <p:cNvSpPr>
-            <a:spLocks noGrp="1"/>
-          </p:cNvSpPr>
-          <p:nvPr>
-            <p:ph type="body" idx="1"/>
-          </p:nvPr>
-        </p:nvSpPr>
-        <p:spPr/>
-        <p:txBody>
-          <a:bodyPr/>
-          <a:lstStyle/>
-          <a:p>
-            <a:r>
-              <a:rPr lang="de-DE" dirty="0" smtClean="0"/>
-              <a:t>Aktuelle Arbeiten</a:t>
-            </a:r>
-            <a:endParaRPr lang="de-DE" dirty="0"/>
-          </a:p>
-        </p:txBody>
-      </p:sp>
-      <p:sp>
-        <p:nvSpPr>
-          <p:cNvPr id="6" name="Inhaltsplatzhalter 5"/>
-          <p:cNvSpPr>
-            <a:spLocks noGrp="1"/>
-          </p:cNvSpPr>
-          <p:nvPr>
-            <p:ph sz="half" idx="2"/>
-          </p:nvPr>
-        </p:nvSpPr>
-        <p:spPr/>
-        <p:txBody>
-          <a:bodyPr/>
-          <a:lstStyle/>
-          <a:p>
-            <a:r>
-              <a:rPr lang="de-DE" dirty="0" smtClean="0"/>
-              <a:t>Importfunktionen</a:t>
-            </a:r>
-          </a:p>
-          <a:p>
-            <a:r>
-              <a:rPr lang="de-DE" dirty="0" smtClean="0"/>
-              <a:t>Erweiterte Unterstützung konkurrierender Systeme in einer Region</a:t>
-            </a:r>
-          </a:p>
-          <a:p>
-            <a:r>
-              <a:rPr lang="de-DE" dirty="0" smtClean="0"/>
-              <a:t>Prüfung der Dateneingabe</a:t>
-            </a:r>
-          </a:p>
-          <a:p>
-            <a:endParaRPr lang="de-DE" dirty="0" smtClean="0"/>
-          </a:p>
-          <a:p>
-            <a:endParaRPr lang="de-DE" dirty="0"/>
-          </a:p>
-        </p:txBody>
-      </p:sp>
-      <p:sp>
-        <p:nvSpPr>
-          <p:cNvPr id="7" name="Textplatzhalter 6"/>
-          <p:cNvSpPr>
-            <a:spLocks noGrp="1"/>
-          </p:cNvSpPr>
-          <p:nvPr>
-            <p:ph type="body" sz="quarter" idx="3"/>
-          </p:nvPr>
-        </p:nvSpPr>
-        <p:spPr/>
-        <p:txBody>
-          <a:bodyPr/>
-          <a:lstStyle/>
-          <a:p>
-            <a:r>
-              <a:rPr lang="de-DE" dirty="0" smtClean="0"/>
-              <a:t>Ausblick</a:t>
-            </a:r>
-            <a:endParaRPr lang="de-DE" dirty="0"/>
-          </a:p>
-        </p:txBody>
-      </p:sp>
-      <p:sp>
-        <p:nvSpPr>
-          <p:cNvPr id="8" name="Inhaltsplatzhalter 7"/>
-          <p:cNvSpPr>
-            <a:spLocks noGrp="1"/>
-          </p:cNvSpPr>
-          <p:nvPr>
-            <p:ph sz="quarter" idx="4"/>
-          </p:nvPr>
-        </p:nvSpPr>
-        <p:spPr/>
-        <p:txBody>
-          <a:bodyPr>
-            <a:normAutofit/>
-          </a:bodyPr>
-          <a:lstStyle/>
-          <a:p>
-            <a:r>
-              <a:rPr lang="de-DE" dirty="0" smtClean="0"/>
-              <a:t>Importfunktionen</a:t>
-            </a:r>
-          </a:p>
-          <a:p>
-            <a:r>
-              <a:rPr lang="de-DE" dirty="0" smtClean="0"/>
-              <a:t>Ästhetik</a:t>
-            </a:r>
-          </a:p>
-          <a:p>
-            <a:r>
-              <a:rPr lang="de-DE" dirty="0" smtClean="0"/>
-              <a:t>Datenquellenzitat als Fußnote unter dem Plot</a:t>
-            </a:r>
-          </a:p>
-          <a:p>
-            <a:r>
-              <a:rPr lang="de-DE" dirty="0" smtClean="0"/>
-              <a:t>Darstellung/Eingabe unsicherer Grenzen</a:t>
-            </a:r>
-          </a:p>
-          <a:p>
-            <a:endParaRPr lang="de-DE" dirty="0" smtClean="0"/>
-          </a:p>
-          <a:p>
-            <a:endParaRPr lang="de-DE" dirty="0"/>
-          </a:p>
-        </p:txBody>
-      </p:sp>
-      <p:sp>
-        <p:nvSpPr>
-          <p:cNvPr id="9" name="Textfeld 8"/>
+          <p:cNvPr id="10" name="Textfeld 9"/>
           <p:cNvSpPr txBox="1"/>
           <p:nvPr/>
         </p:nvSpPr>
         <p:spPr>
           <a:xfrm>
-            <a:off x="642910" y="4286262"/>
-            <a:ext cx="7786742" cy="492443"/>
+            <a:off x="971600" y="4500576"/>
+            <a:ext cx="7239748" cy="276999"/>
           </a:xfrm>
           <a:prstGeom prst="rect">
             <a:avLst/>
@@ -4560,22 +4601,58 @@
           </a:bodyPr>
           <a:lstStyle/>
           <a:p>
-            <a:pPr algn="ctr"/>
-            <a:r>
-              <a:rPr lang="de-DE" sz="2600" b="1" dirty="0" smtClean="0"/>
-              <a:t>Umwandlung des Scripts in ein R-</a:t>
-            </a:r>
-            <a:r>
-              <a:rPr lang="de-DE" sz="2600" b="1" dirty="0" err="1" smtClean="0"/>
-              <a:t>Package</a:t>
-            </a:r>
-            <a:endParaRPr lang="de-DE" sz="2600" b="1" dirty="0"/>
-          </a:p>
-        </p:txBody>
-      </p:sp>
-      <p:sp>
-        <p:nvSpPr>
-          <p:cNvPr id="10" name="Fußzeilenplatzhalter 12"/>
+            <a:r>
+              <a:rPr lang="de-DE" sz="1200" dirty="0" err="1" smtClean="0">
+                <a:latin typeface="Arial Narrow" pitchFamily="34" charset="0"/>
+              </a:rPr>
+              <a:t>ChronochRt</a:t>
+            </a:r>
+            <a:r>
+              <a:rPr lang="de-DE" sz="1200" dirty="0" smtClean="0">
+                <a:latin typeface="Arial Narrow" pitchFamily="34" charset="0"/>
+              </a:rPr>
+              <a:t> Output zur nachmittelalterlichen Belegung einiger Londoner Friedhöfe. (Auszug Wellcome </a:t>
+            </a:r>
+            <a:r>
+              <a:rPr lang="de-DE" sz="1200" dirty="0" err="1" smtClean="0">
+                <a:latin typeface="Arial Narrow" pitchFamily="34" charset="0"/>
+              </a:rPr>
+              <a:t>Osteological</a:t>
+            </a:r>
+            <a:r>
+              <a:rPr lang="de-DE" sz="1200" dirty="0" smtClean="0">
+                <a:latin typeface="Arial Narrow" pitchFamily="34" charset="0"/>
+              </a:rPr>
+              <a:t> Database)</a:t>
+            </a:r>
+            <a:endParaRPr lang="de-DE" sz="1200" dirty="0">
+              <a:latin typeface="Arial Narrow" pitchFamily="34" charset="0"/>
+            </a:endParaRPr>
+          </a:p>
+        </p:txBody>
+      </p:sp>
+      <p:sp>
+        <p:nvSpPr>
+          <p:cNvPr id="6" name="Inhaltsplatzhalter 5"/>
+          <p:cNvSpPr>
+            <a:spLocks noGrp="1"/>
+          </p:cNvSpPr>
+          <p:nvPr>
+            <p:ph sz="half" idx="1"/>
+          </p:nvPr>
+        </p:nvSpPr>
+        <p:spPr/>
+        <p:txBody>
+          <a:bodyPr/>
+          <a:lstStyle/>
+          <a:p>
+            <a:endParaRPr lang="de-DE" dirty="0"/>
+          </a:p>
+        </p:txBody>
+      </p:sp>
+      <p:sp>
+        <p:nvSpPr>
+          <p:cNvPr id="7" name="Fußzeilenplatzhalter 12"/>
           <p:cNvSpPr>
             <a:spLocks noGrp="1"/>
           </p:cNvSpPr>
@@ -4630,6 +4707,39 @@
           </a:p>
         </p:txBody>
       </p:sp>
+      <p:pic>
+        <p:nvPicPr>
+          <p:cNvPr id="3074" name="Picture 2"/>
+          <p:cNvPicPr>
+            <a:picLocks noChangeAspect="1" noChangeArrowheads="1"/>
+          </p:cNvPicPr>
+          <p:nvPr/>
+        </p:nvPicPr>
+        <p:blipFill>
+          <a:blip r:embed="rId2" cstate="print"/>
+          <a:srcRect/>
+          <a:stretch>
+            <a:fillRect/>
+          </a:stretch>
+        </p:blipFill>
+        <p:spPr bwMode="auto">
+          <a:xfrm>
+            <a:off x="1135090" y="1058870"/>
+            <a:ext cx="6912768" cy="3457146"/>
+          </a:xfrm>
+          <a:prstGeom prst="rect">
+            <a:avLst/>
+          </a:prstGeom>
+          <a:noFill/>
+          <a:ln w="9525">
+            <a:noFill/>
+            <a:miter lim="800000"/>
+            <a:headEnd/>
+            <a:tailEnd/>
+          </a:ln>
+          <a:effectLst/>
+        </p:spPr>
+      </p:pic>
     </p:spTree>
   </p:cSld>
   <p:clrMapOvr>
@@ -4657,14 +4767,127 @@
       </p:grpSpPr>
       <p:sp>
         <p:nvSpPr>
-          <p:cNvPr id="15" name="Textfeld 14"/>
+          <p:cNvPr id="2" name="Titel 1"/>
+          <p:cNvSpPr>
+            <a:spLocks noGrp="1"/>
+          </p:cNvSpPr>
+          <p:nvPr>
+            <p:ph type="title"/>
+          </p:nvPr>
+        </p:nvSpPr>
+        <p:spPr/>
+        <p:txBody>
+          <a:bodyPr/>
+          <a:lstStyle/>
+          <a:p>
+            <a:r>
+              <a:rPr lang="de-DE" dirty="0" smtClean="0">
+                <a:latin typeface="Arial Narrow" pitchFamily="34" charset="0"/>
+              </a:rPr>
+              <a:t>Aktueller Stand</a:t>
+            </a:r>
+            <a:endParaRPr lang="de-DE" dirty="0">
+              <a:latin typeface="Arial Narrow" pitchFamily="34" charset="0"/>
+            </a:endParaRPr>
+          </a:p>
+        </p:txBody>
+      </p:sp>
+      <p:sp>
+        <p:nvSpPr>
+          <p:cNvPr id="5" name="Textplatzhalter 4"/>
+          <p:cNvSpPr>
+            <a:spLocks noGrp="1"/>
+          </p:cNvSpPr>
+          <p:nvPr>
+            <p:ph type="body" idx="1"/>
+          </p:nvPr>
+        </p:nvSpPr>
+        <p:spPr/>
+        <p:txBody>
+          <a:bodyPr/>
+          <a:lstStyle/>
+          <a:p>
+            <a:r>
+              <a:rPr lang="de-DE" dirty="0" smtClean="0"/>
+              <a:t>Aktuelle Arbeiten</a:t>
+            </a:r>
+            <a:endParaRPr lang="de-DE" dirty="0"/>
+          </a:p>
+        </p:txBody>
+      </p:sp>
+      <p:sp>
+        <p:nvSpPr>
+          <p:cNvPr id="6" name="Inhaltsplatzhalter 5"/>
+          <p:cNvSpPr>
+            <a:spLocks noGrp="1"/>
+          </p:cNvSpPr>
+          <p:nvPr>
+            <p:ph sz="half" idx="2"/>
+          </p:nvPr>
+        </p:nvSpPr>
+        <p:spPr/>
+        <p:txBody>
+          <a:bodyPr>
+            <a:normAutofit fontScale="92500" lnSpcReduction="10000"/>
+          </a:bodyPr>
+          <a:lstStyle/>
+          <a:p>
+            <a:r>
+              <a:rPr lang="de-DE" dirty="0" smtClean="0"/>
+              <a:t>Importfunktionen</a:t>
+            </a:r>
+          </a:p>
+          <a:p>
+            <a:r>
+              <a:rPr lang="de-DE" dirty="0" smtClean="0"/>
+              <a:t>Erweiterte Unterstützung konkurrierender Systeme in einer Region</a:t>
+            </a:r>
+          </a:p>
+          <a:p>
+            <a:r>
+              <a:rPr lang="de-DE" dirty="0" smtClean="0"/>
+              <a:t>Prüfung der </a:t>
+            </a:r>
+            <a:r>
+              <a:rPr lang="de-DE" dirty="0" smtClean="0"/>
+              <a:t>Dateneingabe</a:t>
+            </a:r>
+          </a:p>
+          <a:p>
+            <a:r>
+              <a:rPr lang="de-DE" dirty="0" smtClean="0"/>
+              <a:t>Perfektionierung der Labels</a:t>
+            </a:r>
+          </a:p>
+          <a:p>
+            <a:r>
+              <a:rPr lang="de-DE" dirty="0" smtClean="0"/>
+              <a:t>Layout (z. </a:t>
+            </a:r>
+            <a:r>
+              <a:rPr lang="de-DE" dirty="0" smtClean="0"/>
+              <a:t>B. Reihenfolge der Regionen)</a:t>
+            </a:r>
+            <a:endParaRPr lang="de-DE" dirty="0" smtClean="0"/>
+          </a:p>
+          <a:p>
+            <a:endParaRPr lang="de-DE" dirty="0" smtClean="0"/>
+          </a:p>
+          <a:p>
+            <a:endParaRPr lang="de-DE" dirty="0"/>
+          </a:p>
+        </p:txBody>
+      </p:sp>
+      <p:sp>
+        <p:nvSpPr>
+          <p:cNvPr id="9" name="Textfeld 8"/>
           <p:cNvSpPr txBox="1"/>
           <p:nvPr/>
         </p:nvSpPr>
         <p:spPr>
           <a:xfrm>
-            <a:off x="4500562" y="2143122"/>
-            <a:ext cx="4429156" cy="1077218"/>
+            <a:off x="642910" y="4383563"/>
+            <a:ext cx="7786742" cy="492443"/>
           </a:xfrm>
           <a:prstGeom prst="rect">
             <a:avLst/>
@@ -4677,193 +4900,651 @@
           </a:bodyPr>
           <a:lstStyle/>
           <a:p>
-            <a:r>
-              <a:rPr lang="de-DE" sz="1600" dirty="0" smtClean="0">
-                <a:solidFill>
-                  <a:schemeClr val="tx2">
-                    <a:lumMod val="50000"/>
-                  </a:schemeClr>
-                </a:solidFill>
-                <a:latin typeface="Arial Narrow" pitchFamily="34" charset="0"/>
-              </a:rPr>
-              <a:t>	                 Kontakt</a:t>
-            </a:r>
-            <a:endParaRPr lang="de-DE" sz="1600" dirty="0" smtClean="0">
-              <a:solidFill>
-                <a:schemeClr val="tx2">
-                  <a:lumMod val="50000"/>
-                </a:schemeClr>
-              </a:solidFill>
+            <a:pPr algn="ctr"/>
+            <a:r>
+              <a:rPr lang="de-DE" sz="2600" b="1" dirty="0" smtClean="0"/>
+              <a:t>Umwandlung des Scripts in ein R-</a:t>
+            </a:r>
+            <a:r>
+              <a:rPr lang="de-DE" sz="2600" b="1" dirty="0" err="1" smtClean="0"/>
+              <a:t>Package</a:t>
+            </a:r>
+            <a:endParaRPr lang="de-DE" sz="2600" b="1" dirty="0"/>
+          </a:p>
+        </p:txBody>
+      </p:sp>
+      <p:sp>
+        <p:nvSpPr>
+          <p:cNvPr id="10" name="Inhaltsplatzhalter 9"/>
+          <p:cNvSpPr>
+            <a:spLocks noGrp="1"/>
+          </p:cNvSpPr>
+          <p:nvPr>
+            <p:ph sz="quarter" idx="4"/>
+          </p:nvPr>
+        </p:nvSpPr>
+        <p:spPr/>
+        <p:txBody>
+          <a:bodyPr/>
+          <a:lstStyle/>
+          <a:p>
+            <a:endParaRPr lang="de-DE"/>
+          </a:p>
+        </p:txBody>
+      </p:sp>
+      <p:sp>
+        <p:nvSpPr>
+          <p:cNvPr id="11" name="Textplatzhalter 10"/>
+          <p:cNvSpPr>
+            <a:spLocks noGrp="1"/>
+          </p:cNvSpPr>
+          <p:nvPr>
+            <p:ph type="body" sz="quarter" idx="3"/>
+          </p:nvPr>
+        </p:nvSpPr>
+        <p:spPr/>
+        <p:txBody>
+          <a:bodyPr/>
+          <a:lstStyle/>
+          <a:p>
+            <a:endParaRPr lang="de-DE"/>
+          </a:p>
+        </p:txBody>
+      </p:sp>
+      <p:sp>
+        <p:nvSpPr>
+          <p:cNvPr id="12" name="Fußzeilenplatzhalter 12"/>
+          <p:cNvSpPr>
+            <a:spLocks noGrp="1"/>
+          </p:cNvSpPr>
+          <p:nvPr>
+            <p:ph type="ftr" sz="quarter" idx="11"/>
+          </p:nvPr>
+        </p:nvSpPr>
+        <p:spPr>
+          <a:xfrm>
+            <a:off x="214282" y="4767263"/>
+            <a:ext cx="5805518" cy="273844"/>
+          </a:xfrm>
+        </p:spPr>
+        <p:txBody>
+          <a:bodyPr/>
+          <a:lstStyle/>
+          <a:p>
+            <a:pPr algn="l"/>
+            <a:r>
+              <a:rPr lang="en-US" sz="1100" dirty="0" smtClean="0">
+                <a:latin typeface="Arial Narrow" pitchFamily="34" charset="0"/>
+              </a:rPr>
+              <a:t>Rose, </a:t>
+            </a:r>
+            <a:r>
+              <a:rPr lang="en-US" sz="1100" dirty="0" err="1" smtClean="0">
+                <a:latin typeface="Arial Narrow" pitchFamily="34" charset="0"/>
+              </a:rPr>
+              <a:t>Girotto</a:t>
+            </a:r>
+            <a:r>
+              <a:rPr lang="en-US" sz="1100" dirty="0" smtClean="0">
+                <a:latin typeface="Arial Narrow" pitchFamily="34" charset="0"/>
+              </a:rPr>
+              <a:t>, </a:t>
+            </a:r>
+            <a:r>
+              <a:rPr lang="en-US" sz="1100" dirty="0" err="1" smtClean="0">
+                <a:latin typeface="Arial Narrow" pitchFamily="34" charset="0"/>
+              </a:rPr>
+              <a:t>ChronochRt</a:t>
+            </a:r>
+            <a:r>
+              <a:rPr lang="en-US" sz="1100" dirty="0" smtClean="0">
+                <a:latin typeface="Arial Narrow" pitchFamily="34" charset="0"/>
+              </a:rPr>
+              <a:t> @CAA-D 2019 Wilhelmshaven</a:t>
+            </a:r>
+            <a:endParaRPr lang="de-DE" sz="1100" dirty="0">
               <a:latin typeface="Arial Narrow" pitchFamily="34" charset="0"/>
             </a:endParaRPr>
           </a:p>
-          <a:p>
-            <a:r>
-              <a:rPr lang="de-DE" sz="1600" dirty="0" smtClean="0">
-                <a:solidFill>
-                  <a:schemeClr val="tx2">
-                    <a:lumMod val="50000"/>
-                  </a:schemeClr>
-                </a:solidFill>
-                <a:latin typeface="Arial Narrow" pitchFamily="34" charset="0"/>
-              </a:rPr>
-              <a:t>Thomas Rose	                Chiara </a:t>
-            </a:r>
-            <a:r>
-              <a:rPr lang="de-DE" sz="1600" dirty="0" smtClean="0">
-                <a:solidFill>
-                  <a:schemeClr val="tx2">
-                    <a:lumMod val="50000"/>
-                  </a:schemeClr>
-                </a:solidFill>
-                <a:latin typeface="Arial Narrow" pitchFamily="34" charset="0"/>
-              </a:rPr>
-              <a:t>G. M. Girotto</a:t>
-            </a:r>
-          </a:p>
-          <a:p>
-            <a:r>
-              <a:rPr lang="de-DE" sz="1600" dirty="0" smtClean="0">
-                <a:solidFill>
-                  <a:schemeClr val="tx2">
-                    <a:lumMod val="50000"/>
-                  </a:schemeClr>
-                </a:solidFill>
-                <a:latin typeface="Arial Narrow" pitchFamily="34" charset="0"/>
-              </a:rPr>
-              <a:t>roset@post.bgu.ac.il</a:t>
-            </a:r>
-            <a:r>
-              <a:rPr lang="de-DE" sz="1600" dirty="0" smtClean="0">
-                <a:solidFill>
-                  <a:schemeClr val="tx2">
-                    <a:lumMod val="50000"/>
-                  </a:schemeClr>
-                </a:solidFill>
-                <a:latin typeface="Arial Narrow" pitchFamily="34" charset="0"/>
-              </a:rPr>
-              <a:t> </a:t>
-            </a:r>
-            <a:r>
-              <a:rPr lang="de-DE" sz="1600" dirty="0" smtClean="0">
-                <a:solidFill>
-                  <a:schemeClr val="tx2">
-                    <a:lumMod val="50000"/>
-                  </a:schemeClr>
-                </a:solidFill>
-                <a:latin typeface="Arial Narrow" pitchFamily="34" charset="0"/>
-              </a:rPr>
-              <a:t>                      chiara.girotto@web.de</a:t>
-            </a:r>
-          </a:p>
-          <a:p>
-            <a:r>
-              <a:rPr lang="de-DE" sz="1600" dirty="0" smtClean="0">
-                <a:solidFill>
-                  <a:schemeClr val="tx2">
-                    <a:lumMod val="50000"/>
-                  </a:schemeClr>
-                </a:solidFill>
-                <a:latin typeface="Arial Narrow" pitchFamily="34" charset="0"/>
-              </a:rPr>
-              <a:t>@</a:t>
-            </a:r>
-            <a:r>
-              <a:rPr lang="de-DE" sz="1600" dirty="0" err="1" smtClean="0">
-                <a:solidFill>
-                  <a:schemeClr val="tx2">
-                    <a:lumMod val="50000"/>
-                  </a:schemeClr>
-                </a:solidFill>
-                <a:latin typeface="Arial Narrow" pitchFamily="34" charset="0"/>
-              </a:rPr>
-              <a:t>roseT</a:t>
-            </a:r>
-            <a:r>
-              <a:rPr lang="de-DE" sz="1600" dirty="0" smtClean="0">
-                <a:solidFill>
-                  <a:schemeClr val="tx2">
-                    <a:lumMod val="50000"/>
-                  </a:schemeClr>
-                </a:solidFill>
-                <a:latin typeface="Arial Narrow" pitchFamily="34" charset="0"/>
-              </a:rPr>
-              <a:t>		                @</a:t>
-            </a:r>
-            <a:r>
-              <a:rPr lang="de-DE" sz="1600" dirty="0" err="1" smtClean="0">
-                <a:solidFill>
-                  <a:schemeClr val="tx2">
-                    <a:lumMod val="50000"/>
-                  </a:schemeClr>
-                </a:solidFill>
-                <a:latin typeface="Arial Narrow" pitchFamily="34" charset="0"/>
-              </a:rPr>
-              <a:t>c_girotto</a:t>
-            </a:r>
-            <a:endParaRPr lang="de-DE" sz="1600" dirty="0" smtClean="0">
-              <a:solidFill>
-                <a:schemeClr val="tx2">
-                  <a:lumMod val="50000"/>
-                </a:schemeClr>
-              </a:solidFill>
+        </p:txBody>
+      </p:sp>
+    </p:spTree>
+  </p:cSld>
+  <p:clrMapOvr>
+    <a:masterClrMapping/>
+  </p:clrMapOvr>
+</p:sld>
+</file>
+
+<file path=ppt/slides/slide15.xml><?xml version="1.0" encoding="utf-8"?>
+<p:sld xmlns:a="http://schemas.openxmlformats.org/drawingml/2006/main" xmlns:r="http://schemas.openxmlformats.org/officeDocument/2006/relationships" xmlns:p="http://schemas.openxmlformats.org/presentationml/2006/main">
+  <p:cSld>
+    <p:spTree>
+      <p:nvGrpSpPr>
+        <p:cNvPr id="1" name=""/>
+        <p:cNvGrpSpPr/>
+        <p:nvPr/>
+      </p:nvGrpSpPr>
+      <p:grpSpPr>
+        <a:xfrm>
+          <a:off x="0" y="0"/>
+          <a:ext cx="0" cy="0"/>
+          <a:chOff x="0" y="0"/>
+          <a:chExt cx="0" cy="0"/>
+        </a:xfrm>
+      </p:grpSpPr>
+      <p:sp>
+        <p:nvSpPr>
+          <p:cNvPr id="2" name="Titel 1"/>
+          <p:cNvSpPr>
+            <a:spLocks noGrp="1"/>
+          </p:cNvSpPr>
+          <p:nvPr>
+            <p:ph type="title"/>
+          </p:nvPr>
+        </p:nvSpPr>
+        <p:spPr/>
+        <p:txBody>
+          <a:bodyPr/>
+          <a:lstStyle/>
+          <a:p>
+            <a:r>
+              <a:rPr lang="de-DE" dirty="0" smtClean="0">
+                <a:latin typeface="Arial Narrow" pitchFamily="34" charset="0"/>
+              </a:rPr>
+              <a:t>Aktueller Stand</a:t>
+            </a:r>
+            <a:endParaRPr lang="de-DE" dirty="0">
               <a:latin typeface="Arial Narrow" pitchFamily="34" charset="0"/>
             </a:endParaRPr>
           </a:p>
         </p:txBody>
       </p:sp>
-      <p:pic>
-        <p:nvPicPr>
-          <p:cNvPr id="16" name="Picture 2" descr="Bildergebnis für gitlab logo"/>
-          <p:cNvPicPr>
-            <a:picLocks noChangeAspect="1" noChangeArrowheads="1"/>
-          </p:cNvPicPr>
+      <p:sp>
+        <p:nvSpPr>
+          <p:cNvPr id="5" name="Textplatzhalter 4"/>
+          <p:cNvSpPr>
+            <a:spLocks noGrp="1"/>
+          </p:cNvSpPr>
+          <p:nvPr>
+            <p:ph type="body" idx="1"/>
+          </p:nvPr>
+        </p:nvSpPr>
+        <p:spPr/>
+        <p:txBody>
+          <a:bodyPr/>
+          <a:lstStyle/>
+          <a:p>
+            <a:r>
+              <a:rPr lang="de-DE" dirty="0" smtClean="0"/>
+              <a:t>Aktuelle Arbeiten</a:t>
+            </a:r>
+            <a:endParaRPr lang="de-DE" dirty="0"/>
+          </a:p>
+        </p:txBody>
+      </p:sp>
+      <p:sp>
+        <p:nvSpPr>
+          <p:cNvPr id="6" name="Inhaltsplatzhalter 5"/>
+          <p:cNvSpPr>
+            <a:spLocks noGrp="1"/>
+          </p:cNvSpPr>
+          <p:nvPr>
+            <p:ph sz="half" idx="2"/>
+          </p:nvPr>
+        </p:nvSpPr>
+        <p:spPr/>
+        <p:txBody>
+          <a:bodyPr>
+            <a:normAutofit fontScale="92500" lnSpcReduction="10000"/>
+          </a:bodyPr>
+          <a:lstStyle/>
+          <a:p>
+            <a:r>
+              <a:rPr lang="de-DE" dirty="0" smtClean="0"/>
+              <a:t>Importfunktionen</a:t>
+            </a:r>
+          </a:p>
+          <a:p>
+            <a:r>
+              <a:rPr lang="de-DE" dirty="0" smtClean="0"/>
+              <a:t>Erweiterte Unterstützung konkurrierender Systeme in einer Region</a:t>
+            </a:r>
+          </a:p>
+          <a:p>
+            <a:r>
+              <a:rPr lang="de-DE" dirty="0" smtClean="0"/>
+              <a:t>Prüfung der Dateneingabe</a:t>
+            </a:r>
+          </a:p>
+          <a:p>
+            <a:r>
+              <a:rPr lang="de-DE" dirty="0" smtClean="0"/>
+              <a:t>Perfektionierung der Labels</a:t>
+            </a:r>
+          </a:p>
+          <a:p>
+            <a:r>
+              <a:rPr lang="de-DE" dirty="0" smtClean="0"/>
+              <a:t>Layout (z. B. Reihenfolge der Regionen)</a:t>
+            </a:r>
+          </a:p>
+          <a:p>
+            <a:endParaRPr lang="de-DE" dirty="0" smtClean="0"/>
+          </a:p>
+          <a:p>
+            <a:endParaRPr lang="de-DE" dirty="0"/>
+          </a:p>
+        </p:txBody>
+      </p:sp>
+      <p:sp>
+        <p:nvSpPr>
+          <p:cNvPr id="7" name="Textplatzhalter 6"/>
+          <p:cNvSpPr>
+            <a:spLocks noGrp="1"/>
+          </p:cNvSpPr>
+          <p:nvPr>
+            <p:ph type="body" sz="quarter" idx="3"/>
+          </p:nvPr>
+        </p:nvSpPr>
+        <p:spPr/>
+        <p:txBody>
+          <a:bodyPr/>
+          <a:lstStyle/>
+          <a:p>
+            <a:r>
+              <a:rPr lang="de-DE" dirty="0" smtClean="0"/>
+              <a:t>Ausblick</a:t>
+            </a:r>
+            <a:endParaRPr lang="de-DE" dirty="0"/>
+          </a:p>
+        </p:txBody>
+      </p:sp>
+      <p:sp>
+        <p:nvSpPr>
+          <p:cNvPr id="8" name="Inhaltsplatzhalter 7"/>
+          <p:cNvSpPr>
+            <a:spLocks noGrp="1"/>
+          </p:cNvSpPr>
+          <p:nvPr>
+            <p:ph sz="quarter" idx="4"/>
+          </p:nvPr>
+        </p:nvSpPr>
+        <p:spPr/>
+        <p:txBody>
+          <a:bodyPr>
+            <a:normAutofit/>
+          </a:bodyPr>
+          <a:lstStyle/>
+          <a:p>
+            <a:r>
+              <a:rPr lang="de-DE" sz="2200" dirty="0" smtClean="0"/>
+              <a:t>Importfunktionen</a:t>
+            </a:r>
+          </a:p>
+          <a:p>
+            <a:r>
+              <a:rPr lang="de-DE" sz="2200" dirty="0" smtClean="0"/>
+              <a:t>Ästhetik</a:t>
+            </a:r>
+          </a:p>
+          <a:p>
+            <a:r>
+              <a:rPr lang="de-DE" sz="2200" dirty="0" smtClean="0"/>
+              <a:t>Darstellung/Eingabe </a:t>
+            </a:r>
+            <a:r>
+              <a:rPr lang="de-DE" sz="2200" dirty="0" smtClean="0"/>
+              <a:t>unsicherer Grenzen</a:t>
+            </a:r>
+          </a:p>
+          <a:p>
+            <a:endParaRPr lang="de-DE" sz="2200" dirty="0" smtClean="0"/>
+          </a:p>
+          <a:p>
+            <a:endParaRPr lang="de-DE" sz="2200" dirty="0"/>
+          </a:p>
+        </p:txBody>
+      </p:sp>
+      <p:sp>
+        <p:nvSpPr>
+          <p:cNvPr id="9" name="Textfeld 8"/>
+          <p:cNvSpPr txBox="1"/>
           <p:nvPr/>
-        </p:nvPicPr>
-        <p:blipFill>
-          <a:blip r:embed="rId2" cstate="print"/>
-          <a:srcRect/>
-          <a:stretch>
-            <a:fillRect/>
-          </a:stretch>
-        </p:blipFill>
-        <p:spPr bwMode="auto">
+        </p:nvSpPr>
+        <p:spPr>
           <a:xfrm>
-            <a:off x="6858016" y="2928940"/>
-            <a:ext cx="307454" cy="293428"/>
+            <a:off x="642910" y="4383563"/>
+            <a:ext cx="7786742" cy="492443"/>
           </a:xfrm>
           <a:prstGeom prst="rect">
             <a:avLst/>
           </a:prstGeom>
           <a:noFill/>
         </p:spPr>
-      </p:pic>
-      <p:pic>
-        <p:nvPicPr>
-          <p:cNvPr id="18" name="Picture 2" descr="Bildergebnis für gitlab logo"/>
-          <p:cNvPicPr>
-            <a:picLocks noChangeAspect="1" noChangeArrowheads="1"/>
-          </p:cNvPicPr>
+        <p:txBody>
+          <a:bodyPr wrap="square" rtlCol="0">
+            <a:spAutoFit/>
+          </a:bodyPr>
+          <a:lstStyle/>
+          <a:p>
+            <a:pPr algn="ctr"/>
+            <a:r>
+              <a:rPr lang="de-DE" sz="2600" b="1" dirty="0" smtClean="0"/>
+              <a:t>Umwandlung des Scripts in ein R-</a:t>
+            </a:r>
+            <a:r>
+              <a:rPr lang="de-DE" sz="2600" b="1" dirty="0" err="1" smtClean="0"/>
+              <a:t>Package</a:t>
+            </a:r>
+            <a:endParaRPr lang="de-DE" sz="2600" b="1" dirty="0"/>
+          </a:p>
+        </p:txBody>
+      </p:sp>
+      <p:sp>
+        <p:nvSpPr>
+          <p:cNvPr id="10" name="Fußzeilenplatzhalter 12"/>
+          <p:cNvSpPr>
+            <a:spLocks noGrp="1"/>
+          </p:cNvSpPr>
+          <p:nvPr>
+            <p:ph type="ftr" sz="quarter" idx="11"/>
+          </p:nvPr>
+        </p:nvSpPr>
+        <p:spPr>
+          <a:xfrm>
+            <a:off x="214282" y="4767263"/>
+            <a:ext cx="5805518" cy="273844"/>
+          </a:xfrm>
+        </p:spPr>
+        <p:txBody>
+          <a:bodyPr/>
+          <a:lstStyle/>
+          <a:p>
+            <a:pPr algn="l"/>
+            <a:r>
+              <a:rPr lang="en-US" sz="1100" dirty="0" smtClean="0">
+                <a:latin typeface="Arial Narrow" pitchFamily="34" charset="0"/>
+              </a:rPr>
+              <a:t>Rose, </a:t>
+            </a:r>
+            <a:r>
+              <a:rPr lang="en-US" sz="1100" dirty="0" err="1" smtClean="0">
+                <a:latin typeface="Arial Narrow" pitchFamily="34" charset="0"/>
+              </a:rPr>
+              <a:t>Girotto</a:t>
+            </a:r>
+            <a:r>
+              <a:rPr lang="en-US" sz="1100" dirty="0" smtClean="0">
+                <a:latin typeface="Arial Narrow" pitchFamily="34" charset="0"/>
+              </a:rPr>
+              <a:t>, </a:t>
+            </a:r>
+            <a:r>
+              <a:rPr lang="en-US" sz="1100" dirty="0" err="1" smtClean="0">
+                <a:latin typeface="Arial Narrow" pitchFamily="34" charset="0"/>
+              </a:rPr>
+              <a:t>ChronochRt</a:t>
+            </a:r>
+            <a:r>
+              <a:rPr lang="en-US" sz="1100" dirty="0" smtClean="0">
+                <a:latin typeface="Arial Narrow" pitchFamily="34" charset="0"/>
+              </a:rPr>
+              <a:t> @CAA-D 2019 Wilhelmshaven</a:t>
+            </a:r>
+            <a:endParaRPr lang="de-DE" sz="1100" dirty="0">
+              <a:latin typeface="Arial Narrow" pitchFamily="34" charset="0"/>
+            </a:endParaRPr>
+          </a:p>
+        </p:txBody>
+      </p:sp>
+    </p:spTree>
+  </p:cSld>
+  <p:clrMapOvr>
+    <a:masterClrMapping/>
+  </p:clrMapOvr>
+</p:sld>
+</file>
+
+<file path=ppt/slides/slide16.xml><?xml version="1.0" encoding="utf-8"?>
+<p:sld xmlns:a="http://schemas.openxmlformats.org/drawingml/2006/main" xmlns:r="http://schemas.openxmlformats.org/officeDocument/2006/relationships" xmlns:p="http://schemas.openxmlformats.org/presentationml/2006/main">
+  <p:cSld>
+    <p:spTree>
+      <p:nvGrpSpPr>
+        <p:cNvPr id="1" name=""/>
+        <p:cNvGrpSpPr/>
+        <p:nvPr/>
+      </p:nvGrpSpPr>
+      <p:grpSpPr>
+        <a:xfrm>
+          <a:off x="0" y="0"/>
+          <a:ext cx="0" cy="0"/>
+          <a:chOff x="0" y="0"/>
+          <a:chExt cx="0" cy="0"/>
+        </a:xfrm>
+      </p:grpSpPr>
+      <p:grpSp>
+        <p:nvGrpSpPr>
+          <p:cNvPr id="11" name="Gruppieren 10"/>
+          <p:cNvGrpSpPr/>
           <p:nvPr/>
-        </p:nvPicPr>
-        <p:blipFill>
-          <a:blip r:embed="rId2" cstate="print"/>
-          <a:srcRect/>
-          <a:stretch>
-            <a:fillRect/>
-          </a:stretch>
-        </p:blipFill>
-        <p:spPr bwMode="auto">
+        </p:nvGrpSpPr>
+        <p:grpSpPr>
           <a:xfrm>
-            <a:off x="4286248" y="2921264"/>
-            <a:ext cx="307454" cy="293428"/>
+            <a:off x="1835696" y="1275606"/>
+            <a:ext cx="5396925" cy="1477328"/>
+            <a:chOff x="3926208" y="2143122"/>
+            <a:chExt cx="5396925" cy="1477328"/>
           </a:xfrm>
-          <a:prstGeom prst="rect">
-            <a:avLst/>
-          </a:prstGeom>
-          <a:noFill/>
-        </p:spPr>
-      </p:pic>
+        </p:grpSpPr>
+        <p:sp>
+          <p:nvSpPr>
+            <p:cNvPr id="15" name="Textfeld 14"/>
+            <p:cNvSpPr txBox="1"/>
+            <p:nvPr/>
+          </p:nvSpPr>
+          <p:spPr>
+            <a:xfrm>
+              <a:off x="4142233" y="2143122"/>
+              <a:ext cx="5180900" cy="1477328"/>
+            </a:xfrm>
+            <a:prstGeom prst="rect">
+              <a:avLst/>
+            </a:prstGeom>
+            <a:noFill/>
+          </p:spPr>
+          <p:txBody>
+            <a:bodyPr wrap="square" rtlCol="0">
+              <a:spAutoFit/>
+            </a:bodyPr>
+            <a:lstStyle/>
+            <a:p>
+              <a:pPr algn="ctr"/>
+              <a:r>
+                <a:rPr lang="de-DE" dirty="0" smtClean="0">
+                  <a:solidFill>
+                    <a:schemeClr val="tx2">
+                      <a:lumMod val="50000"/>
+                    </a:schemeClr>
+                  </a:solidFill>
+                  <a:latin typeface="Arial Narrow" pitchFamily="34" charset="0"/>
+                </a:rPr>
+                <a:t>Kontakt</a:t>
+              </a:r>
+            </a:p>
+            <a:p>
+              <a:pPr algn="ctr"/>
+              <a:endParaRPr lang="de-DE" dirty="0" smtClean="0">
+                <a:solidFill>
+                  <a:schemeClr val="tx2">
+                    <a:lumMod val="50000"/>
+                  </a:schemeClr>
+                </a:solidFill>
+                <a:latin typeface="Arial Narrow" pitchFamily="34" charset="0"/>
+              </a:endParaRPr>
+            </a:p>
+            <a:p>
+              <a:r>
+                <a:rPr lang="de-DE" dirty="0" smtClean="0">
+                  <a:solidFill>
+                    <a:schemeClr val="tx2">
+                      <a:lumMod val="50000"/>
+                    </a:schemeClr>
+                  </a:solidFill>
+                  <a:latin typeface="Arial Narrow" pitchFamily="34" charset="0"/>
+                </a:rPr>
+                <a:t>Thomas Rose	                Chiara G. M. </a:t>
+              </a:r>
+              <a:r>
+                <a:rPr lang="de-DE" dirty="0" err="1" smtClean="0">
+                  <a:solidFill>
+                    <a:schemeClr val="tx2">
+                      <a:lumMod val="50000"/>
+                    </a:schemeClr>
+                  </a:solidFill>
+                  <a:latin typeface="Arial Narrow" pitchFamily="34" charset="0"/>
+                </a:rPr>
+                <a:t>Girotto</a:t>
+              </a:r>
+              <a:endParaRPr lang="de-DE" dirty="0" smtClean="0">
+                <a:solidFill>
+                  <a:schemeClr val="tx2">
+                    <a:lumMod val="50000"/>
+                  </a:schemeClr>
+                </a:solidFill>
+                <a:latin typeface="Arial Narrow" pitchFamily="34" charset="0"/>
+              </a:endParaRPr>
+            </a:p>
+            <a:p>
+              <a:r>
+                <a:rPr lang="de-DE" dirty="0" smtClean="0">
+                  <a:solidFill>
+                    <a:schemeClr val="tx2">
+                      <a:lumMod val="50000"/>
+                    </a:schemeClr>
+                  </a:solidFill>
+                  <a:latin typeface="Arial Narrow" pitchFamily="34" charset="0"/>
+                </a:rPr>
+                <a:t>roset@post.bgu.ac.il                  chiara.girotto@web.de</a:t>
+              </a:r>
+              <a:endParaRPr lang="de-DE" dirty="0" smtClean="0">
+                <a:solidFill>
+                  <a:schemeClr val="tx2">
+                    <a:lumMod val="50000"/>
+                  </a:schemeClr>
+                </a:solidFill>
+                <a:latin typeface="Arial Narrow" pitchFamily="34" charset="0"/>
+              </a:endParaRPr>
+            </a:p>
+            <a:p>
+              <a:r>
+                <a:rPr lang="de-DE" dirty="0" smtClean="0">
+                  <a:solidFill>
+                    <a:schemeClr val="tx2">
+                      <a:lumMod val="50000"/>
+                    </a:schemeClr>
+                  </a:solidFill>
+                  <a:latin typeface="Arial Narrow" pitchFamily="34" charset="0"/>
+                </a:rPr>
+                <a:t>@</a:t>
+              </a:r>
+              <a:r>
+                <a:rPr lang="de-DE" dirty="0" err="1" smtClean="0">
+                  <a:solidFill>
+                    <a:schemeClr val="tx2">
+                      <a:lumMod val="50000"/>
+                    </a:schemeClr>
+                  </a:solidFill>
+                  <a:latin typeface="Arial Narrow" pitchFamily="34" charset="0"/>
+                </a:rPr>
+                <a:t>roseT</a:t>
+              </a:r>
+              <a:r>
+                <a:rPr lang="de-DE" dirty="0" smtClean="0">
+                  <a:solidFill>
+                    <a:schemeClr val="tx2">
+                      <a:lumMod val="50000"/>
+                    </a:schemeClr>
+                  </a:solidFill>
+                  <a:latin typeface="Arial Narrow" pitchFamily="34" charset="0"/>
+                </a:rPr>
+                <a:t>		                @</a:t>
+              </a:r>
+              <a:r>
+                <a:rPr lang="de-DE" dirty="0" err="1" smtClean="0">
+                  <a:solidFill>
+                    <a:schemeClr val="tx2">
+                      <a:lumMod val="50000"/>
+                    </a:schemeClr>
+                  </a:solidFill>
+                  <a:latin typeface="Arial Narrow" pitchFamily="34" charset="0"/>
+                </a:rPr>
+                <a:t>c_girotto</a:t>
+              </a:r>
+              <a:endParaRPr lang="de-DE" dirty="0" smtClean="0">
+                <a:solidFill>
+                  <a:schemeClr val="tx2">
+                    <a:lumMod val="50000"/>
+                  </a:schemeClr>
+                </a:solidFill>
+                <a:latin typeface="Arial Narrow" pitchFamily="34" charset="0"/>
+              </a:endParaRPr>
+            </a:p>
+          </p:txBody>
+        </p:sp>
+        <p:pic>
+          <p:nvPicPr>
+            <p:cNvPr id="16" name="Picture 2" descr="Bildergebnis für gitlab logo"/>
+            <p:cNvPicPr>
+              <a:picLocks noChangeAspect="1" noChangeArrowheads="1"/>
+            </p:cNvPicPr>
+            <p:nvPr/>
+          </p:nvPicPr>
+          <p:blipFill>
+            <a:blip r:embed="rId2" cstate="print"/>
+            <a:srcRect/>
+            <a:stretch>
+              <a:fillRect/>
+            </a:stretch>
+          </p:blipFill>
+          <p:spPr bwMode="auto">
+            <a:xfrm>
+              <a:off x="6590504" y="3289854"/>
+              <a:ext cx="307454" cy="293428"/>
+            </a:xfrm>
+            <a:prstGeom prst="rect">
+              <a:avLst/>
+            </a:prstGeom>
+            <a:noFill/>
+          </p:spPr>
+        </p:pic>
+        <p:pic>
+          <p:nvPicPr>
+            <p:cNvPr id="18" name="Picture 2" descr="Bildergebnis für gitlab logo"/>
+            <p:cNvPicPr>
+              <a:picLocks noChangeAspect="1" noChangeArrowheads="1"/>
+            </p:cNvPicPr>
+            <p:nvPr/>
+          </p:nvPicPr>
+          <p:blipFill>
+            <a:blip r:embed="rId2" cstate="print"/>
+            <a:srcRect/>
+            <a:stretch>
+              <a:fillRect/>
+            </a:stretch>
+          </p:blipFill>
+          <p:spPr bwMode="auto">
+            <a:xfrm>
+              <a:off x="3926208" y="3289854"/>
+              <a:ext cx="307454" cy="293428"/>
+            </a:xfrm>
+            <a:prstGeom prst="rect">
+              <a:avLst/>
+            </a:prstGeom>
+            <a:noFill/>
+          </p:spPr>
+        </p:pic>
+      </p:grpSp>
       <p:sp>
         <p:nvSpPr>
           <p:cNvPr id="19" name="Textfeld 18"/>
@@ -4916,7 +5597,7 @@
         </p:blipFill>
         <p:spPr bwMode="auto">
           <a:xfrm>
-            <a:off x="285720" y="2809916"/>
+            <a:off x="323528" y="3922017"/>
             <a:ext cx="1214446" cy="809973"/>
           </a:xfrm>
           <a:prstGeom prst="rect">
@@ -4933,8 +5614,8 @@
         </p:nvSpPr>
         <p:spPr>
           <a:xfrm>
-            <a:off x="285720" y="3643320"/>
-            <a:ext cx="4000528" cy="1077218"/>
+            <a:off x="1691680" y="4034616"/>
+            <a:ext cx="6736832" cy="584775"/>
           </a:xfrm>
           <a:prstGeom prst="rect">
             <a:avLst/>
@@ -4983,58 +5664,6 @@
           </a:p>
         </p:txBody>
       </p:sp>
-      <p:pic>
-        <p:nvPicPr>
-          <p:cNvPr id="22" name="Picture 2" descr="C:\Dokumente\Forschung\Projekte\Promotion\Logos_Vorlagen\ed-archmat.png"/>
-          <p:cNvPicPr>
-            <a:picLocks noChangeAspect="1" noChangeArrowheads="1"/>
-          </p:cNvPicPr>
-          <p:nvPr/>
-        </p:nvPicPr>
-        <p:blipFill>
-          <a:blip r:embed="rId4" cstate="print"/>
-          <a:srcRect/>
-          <a:stretch>
-            <a:fillRect/>
-          </a:stretch>
-        </p:blipFill>
-        <p:spPr bwMode="auto">
-          <a:xfrm>
-            <a:off x="1785918" y="2928940"/>
-            <a:ext cx="2214578" cy="508995"/>
-          </a:xfrm>
-          <a:prstGeom prst="rect">
-            <a:avLst/>
-          </a:prstGeom>
-          <a:noFill/>
-        </p:spPr>
-      </p:pic>
-      <p:pic>
-        <p:nvPicPr>
-          <p:cNvPr id="23" name="Picture 3" descr="C:\Users\Thomas\Desktop\BGU.sig2.E.jpg"/>
-          <p:cNvPicPr>
-            <a:picLocks noChangeAspect="1" noChangeArrowheads="1"/>
-          </p:cNvPicPr>
-          <p:nvPr/>
-        </p:nvPicPr>
-        <p:blipFill>
-          <a:blip r:embed="rId5" cstate="print"/>
-          <a:srcRect/>
-          <a:stretch>
-            <a:fillRect/>
-          </a:stretch>
-        </p:blipFill>
-        <p:spPr bwMode="auto">
-          <a:xfrm>
-            <a:off x="928662" y="1428742"/>
-            <a:ext cx="2389981" cy="1316831"/>
-          </a:xfrm>
-          <a:prstGeom prst="rect">
-            <a:avLst/>
-          </a:prstGeom>
-          <a:noFill/>
-        </p:spPr>
-      </p:pic>
       <p:sp>
         <p:nvSpPr>
           <p:cNvPr id="24" name="Fußzeilenplatzhalter 12"/>
@@ -5167,7 +5796,7 @@
           <p:nvPr/>
         </p:nvPicPr>
         <p:blipFill>
-          <a:blip r:embed="rId2"/>
+          <a:blip r:embed="rId2" cstate="print"/>
           <a:srcRect/>
           <a:stretch>
             <a:fillRect/>
@@ -5214,18 +5843,7 @@
                 </a:solidFill>
                 <a:latin typeface="Arial Narrow" pitchFamily="34" charset="0"/>
               </a:rPr>
-              <a:t>https://www.dartmouth.edu/~prehistory/aegean/?</a:t>
-            </a:r>
-            <a:r>
-              <a:rPr lang="de-DE" sz="1200" dirty="0" smtClean="0">
-                <a:solidFill>
-                  <a:schemeClr val="bg1">
-                    <a:lumMod val="50000"/>
-                  </a:schemeClr>
-                </a:solidFill>
-                <a:latin typeface="Arial Narrow" pitchFamily="34" charset="0"/>
-              </a:rPr>
-              <a:t>page_id=67, 22.09.2019.</a:t>
+              <a:t>https://www.dartmouth.edu/~prehistory/aegean/?page_id=67, 22.09.2019.</a:t>
             </a:r>
             <a:endParaRPr lang="de-DE" sz="1200" dirty="0">
               <a:solidFill>
@@ -5428,7 +6046,7 @@
           <p:nvPr/>
         </p:nvPicPr>
         <p:blipFill>
-          <a:blip r:embed="rId2">
+          <a:blip r:embed="rId2" cstate="print">
             <a:duotone>
               <a:schemeClr val="bg2">
                 <a:shade val="45000"/>
@@ -5483,18 +6101,7 @@
                 </a:solidFill>
                 <a:latin typeface="Arial Narrow" pitchFamily="34" charset="0"/>
               </a:rPr>
-              <a:t>https://www.dartmouth.edu/~prehistory/aegean/?</a:t>
-            </a:r>
-            <a:r>
-              <a:rPr lang="de-DE" sz="1200" dirty="0" smtClean="0">
-                <a:solidFill>
-                  <a:schemeClr val="bg1">
-                    <a:lumMod val="50000"/>
-                  </a:schemeClr>
-                </a:solidFill>
-                <a:latin typeface="Arial Narrow" pitchFamily="34" charset="0"/>
-              </a:rPr>
-              <a:t>page_id=67, 22.09.2019.</a:t>
+              <a:t>https://www.dartmouth.edu/~prehistory/aegean/?page_id=67, 22.09.2019.</a:t>
             </a:r>
             <a:endParaRPr lang="de-DE" sz="1200" dirty="0">
               <a:solidFill>
@@ -5550,7 +6157,7 @@
           <p:nvPr/>
         </p:nvPicPr>
         <p:blipFill>
-          <a:blip r:embed="rId3"/>
+          <a:blip r:embed="rId3" cstate="print"/>
           <a:srcRect r="17409" b="52737"/>
           <a:stretch>
             <a:fillRect/>
@@ -5643,18 +6250,7 @@
                 </a:solidFill>
                 <a:latin typeface="Arial Narrow" pitchFamily="34" charset="0"/>
               </a:rPr>
-              <a:t>http://</a:t>
-            </a:r>
-            <a:r>
-              <a:rPr lang="de-DE" sz="1200" dirty="0" smtClean="0">
-                <a:solidFill>
-                  <a:schemeClr val="bg1">
-                    <a:lumMod val="50000"/>
-                  </a:schemeClr>
-                </a:solidFill>
-                <a:latin typeface="Arial Narrow" pitchFamily="34" charset="0"/>
-              </a:rPr>
-              <a:t>aragats.arts.cornell.edu/wp-content/uploads/2012/10/</a:t>
+              <a:t>http://aragats.arts.cornell.edu/wp-content/uploads/2012/10/</a:t>
             </a:r>
           </a:p>
           <a:p>
@@ -5812,7 +6408,7 @@
           <p:nvPr/>
         </p:nvPicPr>
         <p:blipFill>
-          <a:blip r:embed="rId2"/>
+          <a:blip r:embed="rId2" cstate="print"/>
           <a:srcRect r="17409" b="52737"/>
           <a:stretch>
             <a:fillRect/>
@@ -5905,18 +6501,7 @@
                 </a:solidFill>
                 <a:latin typeface="Arial Narrow" pitchFamily="34" charset="0"/>
               </a:rPr>
-              <a:t>http://</a:t>
-            </a:r>
-            <a:r>
-              <a:rPr lang="de-DE" sz="1200" dirty="0" smtClean="0">
-                <a:solidFill>
-                  <a:schemeClr val="bg1">
-                    <a:lumMod val="50000"/>
-                  </a:schemeClr>
-                </a:solidFill>
-                <a:latin typeface="Arial Narrow" pitchFamily="34" charset="0"/>
-              </a:rPr>
-              <a:t>aragats.arts.cornell.edu/wp-content/uploads/2012/10/</a:t>
+              <a:t>http://aragats.arts.cornell.edu/wp-content/uploads/2012/10/</a:t>
             </a:r>
           </a:p>
           <a:p>
@@ -5982,28 +6567,16 @@
               <a:rPr lang="de-DE" sz="2000" dirty="0" smtClean="0">
                 <a:latin typeface="Arial Narrow" pitchFamily="34" charset="0"/>
               </a:rPr>
-              <a:t> </a:t>
-            </a:r>
+              <a:t> aufwendige nachträgliche Änderungen</a:t>
+            </a:r>
+          </a:p>
+          <a:p>
+            <a:pPr algn="ctr"/>
             <a:r>
               <a:rPr lang="de-DE" sz="2000" dirty="0" smtClean="0">
                 <a:latin typeface="Arial Narrow" pitchFamily="34" charset="0"/>
               </a:rPr>
-              <a:t>aufwendige nachträgliche Änderungen</a:t>
-            </a:r>
-          </a:p>
-          <a:p>
-            <a:pPr algn="ctr"/>
-            <a:r>
-              <a:rPr lang="de-DE" sz="2000" dirty="0" smtClean="0">
-                <a:latin typeface="Arial Narrow" pitchFamily="34" charset="0"/>
-              </a:rPr>
-              <a:t> </a:t>
-            </a:r>
-            <a:r>
-              <a:rPr lang="de-DE" sz="2000" dirty="0" smtClean="0">
-                <a:latin typeface="Arial Narrow" pitchFamily="34" charset="0"/>
-              </a:rPr>
-              <a:t>Ereignisdaten schwer visualisierbar</a:t>
+              <a:t> Ereignisdaten schwer visualisierbar</a:t>
             </a:r>
           </a:p>
           <a:p>
@@ -6072,7 +6645,7 @@
               <a:rPr lang="de-DE" sz="1400" dirty="0" smtClean="0">
                 <a:latin typeface="Arial Narrow" pitchFamily="34" charset="0"/>
               </a:rPr>
-              <a:t>	(oder </a:t>
+              <a:t>(oder </a:t>
             </a:r>
             <a:r>
               <a:rPr lang="de-DE" sz="1400" dirty="0" err="1" smtClean="0">
@@ -6303,9 +6876,6 @@
               </a:rPr>
               <a:t>-Punkt Diagramme</a:t>
             </a:r>
-            <a:endParaRPr lang="de-DE" sz="1800" dirty="0" smtClean="0">
-              <a:latin typeface="Arial Narrow" pitchFamily="34" charset="0"/>
-            </a:endParaRPr>
           </a:p>
           <a:p>
             <a:pPr lvl="1"/>
@@ -6313,13 +6883,7 @@
               <a:rPr lang="de-DE" sz="1800" dirty="0" smtClean="0">
                 <a:latin typeface="Arial Narrow" pitchFamily="34" charset="0"/>
               </a:rPr>
-              <a:t>Sequenz </a:t>
-            </a:r>
-            <a:r>
-              <a:rPr lang="de-DE" sz="1800" dirty="0" smtClean="0">
-                <a:latin typeface="Arial Narrow" pitchFamily="34" charset="0"/>
-              </a:rPr>
-              <a:t>Diagramme</a:t>
+              <a:t>Sequenz Diagramme</a:t>
             </a:r>
           </a:p>
           <a:p>
@@ -6327,13 +6891,7 @@
               <a:rPr lang="de-DE" sz="2400" dirty="0" err="1" smtClean="0">
                 <a:latin typeface="Arial Narrow" pitchFamily="34" charset="0"/>
               </a:rPr>
-              <a:t>t</a:t>
-            </a:r>
-            <a:r>
-              <a:rPr lang="de-DE" sz="2400" dirty="0" err="1" smtClean="0">
-                <a:latin typeface="Arial Narrow" pitchFamily="34" charset="0"/>
-              </a:rPr>
-              <a:t>imevis</a:t>
+              <a:t>timevis</a:t>
             </a:r>
             <a:endParaRPr lang="de-DE" sz="2400" dirty="0" smtClean="0">
               <a:latin typeface="Arial Narrow" pitchFamily="34" charset="0"/>
@@ -6346,9 +6904,6 @@
               </a:rPr>
               <a:t>ggplot2</a:t>
             </a:r>
-            <a:endParaRPr lang="de-DE" sz="2400" dirty="0" smtClean="0">
-              <a:latin typeface="Arial Narrow" pitchFamily="34" charset="0"/>
-            </a:endParaRPr>
           </a:p>
           <a:p>
             <a:r>
@@ -6357,9 +6912,6 @@
               </a:rPr>
               <a:t>………</a:t>
             </a:r>
-            <a:endParaRPr lang="de-DE" sz="2400" dirty="0" smtClean="0">
-              <a:latin typeface="Arial Narrow" pitchFamily="34" charset="0"/>
-            </a:endParaRPr>
           </a:p>
         </p:txBody>
       </p:sp>
@@ -6589,9 +7141,6 @@
               </a:rPr>
               <a:t>-Punkt Diagramme</a:t>
             </a:r>
-            <a:endParaRPr lang="de-DE" sz="1800" dirty="0" smtClean="0">
-              <a:latin typeface="Arial Narrow" pitchFamily="34" charset="0"/>
-            </a:endParaRPr>
           </a:p>
           <a:p>
             <a:pPr lvl="1"/>
@@ -6599,13 +7148,7 @@
               <a:rPr lang="de-DE" sz="1800" dirty="0" smtClean="0">
                 <a:latin typeface="Arial Narrow" pitchFamily="34" charset="0"/>
               </a:rPr>
-              <a:t>Sequenz </a:t>
-            </a:r>
-            <a:r>
-              <a:rPr lang="de-DE" sz="1800" dirty="0" smtClean="0">
-                <a:latin typeface="Arial Narrow" pitchFamily="34" charset="0"/>
-              </a:rPr>
-              <a:t>Diagramme</a:t>
+              <a:t>Sequenz Diagramme</a:t>
             </a:r>
           </a:p>
           <a:p>
@@ -6613,13 +7156,7 @@
               <a:rPr lang="de-DE" sz="2400" dirty="0" err="1" smtClean="0">
                 <a:latin typeface="Arial Narrow" pitchFamily="34" charset="0"/>
               </a:rPr>
-              <a:t>t</a:t>
-            </a:r>
-            <a:r>
-              <a:rPr lang="de-DE" sz="2400" dirty="0" err="1" smtClean="0">
-                <a:latin typeface="Arial Narrow" pitchFamily="34" charset="0"/>
-              </a:rPr>
-              <a:t>imevis</a:t>
+              <a:t>timevis</a:t>
             </a:r>
             <a:endParaRPr lang="de-DE" sz="2400" dirty="0" smtClean="0">
               <a:latin typeface="Arial Narrow" pitchFamily="34" charset="0"/>
@@ -6632,9 +7169,6 @@
               </a:rPr>
               <a:t>ggplot2</a:t>
             </a:r>
-            <a:endParaRPr lang="de-DE" sz="2400" dirty="0" smtClean="0">
-              <a:latin typeface="Arial Narrow" pitchFamily="34" charset="0"/>
-            </a:endParaRPr>
           </a:p>
           <a:p>
             <a:r>
@@ -6643,9 +7177,6 @@
               </a:rPr>
               <a:t>………</a:t>
             </a:r>
-            <a:endParaRPr lang="de-DE" sz="2400" dirty="0" smtClean="0">
-              <a:latin typeface="Arial Narrow" pitchFamily="34" charset="0"/>
-            </a:endParaRPr>
           </a:p>
         </p:txBody>
       </p:sp>
@@ -6912,11 +7443,7 @@
             </a:pPr>
             <a:r>
               <a:rPr lang="de-DE" dirty="0" err="1" smtClean="0"/>
-              <a:t>t</a:t>
-            </a:r>
-            <a:r>
-              <a:rPr lang="de-DE" dirty="0" err="1" smtClean="0"/>
-              <a:t>idyverse</a:t>
+              <a:t>tidyverse</a:t>
             </a:r>
             <a:endParaRPr lang="de-DE" dirty="0" smtClean="0"/>
           </a:p>
@@ -6945,7 +7472,7 @@
             </a:r>
             <a:r>
               <a:rPr lang="de-DE" dirty="0" err="1" smtClean="0"/>
-              <a:t>xlxs</a:t>
+              <a:t>xlsx</a:t>
             </a:r>
             <a:r>
               <a:rPr lang="de-DE" dirty="0" smtClean="0"/>
@@ -7002,16 +7529,25 @@
             </a:pPr>
             <a:r>
               <a:rPr lang="de-DE" dirty="0" smtClean="0"/>
-              <a:t>Konkurrierende </a:t>
+              <a:t>Konkurrierendes </a:t>
             </a:r>
             <a:r>
               <a:rPr lang="de-DE" dirty="0" err="1" smtClean="0"/>
-              <a:t>Chronologiesysteme</a:t>
+              <a:t>Chronologiesystem</a:t>
             </a:r>
             <a:r>
               <a:rPr lang="de-DE" dirty="0" smtClean="0"/>
-              <a:t> in einer Spalte </a:t>
-            </a:r>
+              <a:t> </a:t>
+            </a:r>
+            <a:r>
+              <a:rPr lang="de-DE" dirty="0" smtClean="0"/>
+              <a:t>in </a:t>
+            </a:r>
+            <a:r>
+              <a:rPr lang="de-DE" dirty="0" smtClean="0"/>
+              <a:t>gleicher Spalte </a:t>
+            </a:r>
+            <a:endParaRPr lang="de-DE" dirty="0" smtClean="0"/>
           </a:p>
           <a:p>
             <a:pPr algn="ctr">
@@ -7141,6 +7677,48 @@
       </p:grpSpPr>
       <p:sp>
         <p:nvSpPr>
+          <p:cNvPr id="9" name="Inhaltsplatzhalter 8"/>
+          <p:cNvSpPr>
+            <a:spLocks noGrp="1"/>
+          </p:cNvSpPr>
+          <p:nvPr>
+            <p:ph sz="half" idx="2"/>
+          </p:nvPr>
+        </p:nvSpPr>
+        <p:spPr/>
+        <p:txBody>
+          <a:bodyPr>
+            <a:normAutofit/>
+          </a:bodyPr>
+          <a:lstStyle/>
+          <a:p>
+            <a:endParaRPr lang="de-DE" dirty="0"/>
+          </a:p>
+        </p:txBody>
+      </p:sp>
+      <p:sp>
+        <p:nvSpPr>
+          <p:cNvPr id="10" name="Inhaltsplatzhalter 9"/>
+          <p:cNvSpPr>
+            <a:spLocks noGrp="1"/>
+          </p:cNvSpPr>
+          <p:nvPr>
+            <p:ph sz="half" idx="1"/>
+          </p:nvPr>
+        </p:nvSpPr>
+        <p:spPr/>
+        <p:txBody>
+          <a:bodyPr>
+            <a:normAutofit/>
+          </a:bodyPr>
+          <a:lstStyle/>
+          <a:p>
+            <a:endParaRPr lang="de-DE" dirty="0"/>
+          </a:p>
+        </p:txBody>
+      </p:sp>
+      <p:sp>
+        <p:nvSpPr>
           <p:cNvPr id="2" name="Titel 1"/>
           <p:cNvSpPr>
             <a:spLocks noGrp="1"/>
@@ -7163,62 +7741,6 @@
             <a:endParaRPr lang="de-DE" dirty="0">
               <a:latin typeface="Arial Narrow" pitchFamily="34" charset="0"/>
             </a:endParaRPr>
-          </a:p>
-        </p:txBody>
-      </p:sp>
-      <p:sp>
-        <p:nvSpPr>
-          <p:cNvPr id="3" name="Inhaltsplatzhalter 2"/>
-          <p:cNvSpPr>
-            <a:spLocks noGrp="1"/>
-          </p:cNvSpPr>
-          <p:nvPr>
-            <p:ph sz="half" idx="1"/>
-          </p:nvPr>
-        </p:nvSpPr>
-        <p:spPr/>
-        <p:txBody>
-          <a:bodyPr>
-            <a:normAutofit/>
-          </a:bodyPr>
-          <a:lstStyle/>
-          <a:p>
-            <a:r>
-              <a:rPr lang="de-DE" dirty="0" smtClean="0"/>
-              <a:t>Hier </a:t>
-            </a:r>
-            <a:r>
-              <a:rPr lang="de-DE" dirty="0" err="1" smtClean="0"/>
-              <a:t>Fake</a:t>
-            </a:r>
-            <a:r>
-              <a:rPr lang="de-DE" dirty="0" smtClean="0"/>
-              <a:t> Beispielcode</a:t>
-            </a:r>
-            <a:endParaRPr lang="de-DE" dirty="0"/>
-          </a:p>
-        </p:txBody>
-      </p:sp>
-      <p:sp>
-        <p:nvSpPr>
-          <p:cNvPr id="7" name="Inhaltsplatzhalter 6"/>
-          <p:cNvSpPr>
-            <a:spLocks noGrp="1"/>
-          </p:cNvSpPr>
-          <p:nvPr>
-            <p:ph sz="half" idx="2"/>
-          </p:nvPr>
-        </p:nvSpPr>
-        <p:spPr/>
-        <p:txBody>
-          <a:bodyPr/>
-          <a:lstStyle/>
-          <a:p>
-            <a:r>
-              <a:rPr lang="de-DE" dirty="0" smtClean="0"/>
-              <a:t>Hier Beispielbild</a:t>
-            </a:r>
-            <a:endParaRPr lang="de-DE" dirty="0"/>
           </a:p>
         </p:txBody>
       </p:sp>
@@ -7279,6 +7801,71 @@
           </a:p>
         </p:txBody>
       </p:sp>
+      <p:pic>
+        <p:nvPicPr>
+          <p:cNvPr id="2052" name="Picture 4"/>
+          <p:cNvPicPr>
+            <a:picLocks noChangeAspect="1" noChangeArrowheads="1"/>
+          </p:cNvPicPr>
+          <p:nvPr/>
+        </p:nvPicPr>
+        <p:blipFill>
+          <a:blip r:embed="rId2" cstate="print"/>
+          <a:srcRect l="4762" t="14286" r="22619" b="8929"/>
+          <a:stretch>
+            <a:fillRect/>
+          </a:stretch>
+        </p:blipFill>
+        <p:spPr bwMode="auto">
+          <a:xfrm>
+            <a:off x="395536" y="1203597"/>
+            <a:ext cx="4752528" cy="3350143"/>
+          </a:xfrm>
+          <a:prstGeom prst="rect">
+            <a:avLst/>
+          </a:prstGeom>
+          <a:noFill/>
+          <a:ln w="9525">
+            <a:noFill/>
+            <a:miter lim="800000"/>
+            <a:headEnd/>
+            <a:tailEnd/>
+          </a:ln>
+        </p:spPr>
+      </p:pic>
+      <p:pic>
+        <p:nvPicPr>
+          <p:cNvPr id="2051" name="Picture 3"/>
+          <p:cNvPicPr>
+            <a:picLocks noChangeAspect="1" noChangeArrowheads="1"/>
+          </p:cNvPicPr>
+          <p:nvPr/>
+        </p:nvPicPr>
+        <p:blipFill>
+          <a:blip r:embed="rId3" cstate="print"/>
+          <a:srcRect/>
+          <a:stretch>
+            <a:fillRect/>
+          </a:stretch>
+        </p:blipFill>
+        <p:spPr bwMode="auto">
+          <a:xfrm>
+            <a:off x="4572000" y="1203598"/>
+            <a:ext cx="4428282" cy="3161730"/>
+          </a:xfrm>
+          <a:prstGeom prst="rect">
+            <a:avLst/>
+          </a:prstGeom>
+          <a:noFill/>
+          <a:ln w="9525">
+            <a:noFill/>
+            <a:miter lim="800000"/>
+            <a:headEnd/>
+            <a:tailEnd/>
+          </a:ln>
+          <a:effectLst/>
+        </p:spPr>
+      </p:pic>
     </p:spTree>
   </p:cSld>
   <p:clrMapOvr>
@@ -7361,7 +7948,7 @@
           </p:nvPr>
         </p:nvPicPr>
         <p:blipFill>
-          <a:blip r:embed="rId2"/>
+          <a:blip r:embed="rId2" cstate="print"/>
           <a:srcRect l="-614" t="24008" r="67100" b="33118"/>
           <a:stretch>
             <a:fillRect/>
@@ -7427,7 +8014,7 @@
         </p:nvSpPr>
         <p:spPr>
           <a:xfrm>
-            <a:off x="4643438" y="4643452"/>
+            <a:off x="4643438" y="4500576"/>
             <a:ext cx="3714776" cy="276999"/>
           </a:xfrm>
           <a:prstGeom prst="rect">
@@ -7528,6 +8115,39 @@
           </a:p>
         </p:txBody>
       </p:sp>
+      <p:pic>
+        <p:nvPicPr>
+          <p:cNvPr id="4098" name="Picture 2"/>
+          <p:cNvPicPr>
+            <a:picLocks noChangeAspect="1" noChangeArrowheads="1"/>
+          </p:cNvPicPr>
+          <p:nvPr/>
+        </p:nvPicPr>
+        <p:blipFill>
+          <a:blip r:embed="rId3" cstate="print"/>
+          <a:srcRect/>
+          <a:stretch>
+            <a:fillRect/>
+          </a:stretch>
+        </p:blipFill>
+        <p:spPr bwMode="auto">
+          <a:xfrm>
+            <a:off x="4538525" y="1419572"/>
+            <a:ext cx="4425963" cy="2952378"/>
+          </a:xfrm>
+          <a:prstGeom prst="rect">
+            <a:avLst/>
+          </a:prstGeom>
+          <a:noFill/>
+          <a:ln w="9525">
+            <a:noFill/>
+            <a:miter lim="800000"/>
+            <a:headEnd/>
+            <a:tailEnd/>
+          </a:ln>
+          <a:effectLst/>
+        </p:spPr>
+      </p:pic>
     </p:spTree>
   </p:cSld>
   <p:clrMapOvr>

</xml_diff>